<commit_message>
Chapter 05 - updated
</commit_message>
<xml_diff>
--- a/CS106 - Digital Logic/Chapter 5- Synchronous Sequential Logic.ppt.pptx
+++ b/CS106 - Digital Logic/Chapter 5- Synchronous Sequential Logic.ppt.pptx
@@ -69,6 +69,25 @@
     <p:sldId id="320" r:id="rId63"/>
     <p:sldId id="321" r:id="rId64"/>
     <p:sldId id="322" r:id="rId65"/>
+    <p:sldId id="323" r:id="rId66"/>
+    <p:sldId id="324" r:id="rId67"/>
+    <p:sldId id="331" r:id="rId68"/>
+    <p:sldId id="325" r:id="rId69"/>
+    <p:sldId id="326" r:id="rId70"/>
+    <p:sldId id="327" r:id="rId71"/>
+    <p:sldId id="328" r:id="rId72"/>
+    <p:sldId id="329" r:id="rId73"/>
+    <p:sldId id="330" r:id="rId74"/>
+    <p:sldId id="332" r:id="rId75"/>
+    <p:sldId id="333" r:id="rId76"/>
+    <p:sldId id="334" r:id="rId77"/>
+    <p:sldId id="341" r:id="rId78"/>
+    <p:sldId id="335" r:id="rId79"/>
+    <p:sldId id="336" r:id="rId80"/>
+    <p:sldId id="337" r:id="rId81"/>
+    <p:sldId id="338" r:id="rId82"/>
+    <p:sldId id="339" r:id="rId83"/>
+    <p:sldId id="340" r:id="rId84"/>
   </p:sldIdLst>
   <p:sldSz cx="12192000" cy="6858000"/>
   <p:notesSz cx="6858000" cy="9144000"/>
@@ -322,7 +341,7 @@
           <a:p>
             <a:fld id="{8CE62417-84E5-4A58-8223-BAF15DAC8247}" type="datetimeFigureOut">
               <a:rPr lang="en-US" smtClean="0"/>
-              <a:t>7/15/2019</a:t>
+              <a:t>7/16/2019</a:t>
             </a:fld>
             <a:endParaRPr lang="en-US" dirty="0"/>
           </a:p>
@@ -520,7 +539,7 @@
           <a:p>
             <a:fld id="{8CE62417-84E5-4A58-8223-BAF15DAC8247}" type="datetimeFigureOut">
               <a:rPr lang="en-US" smtClean="0"/>
-              <a:t>7/15/2019</a:t>
+              <a:t>7/16/2019</a:t>
             </a:fld>
             <a:endParaRPr lang="en-US" dirty="0"/>
           </a:p>
@@ -728,7 +747,7 @@
           <a:p>
             <a:fld id="{8CE62417-84E5-4A58-8223-BAF15DAC8247}" type="datetimeFigureOut">
               <a:rPr lang="en-US" smtClean="0"/>
-              <a:t>7/15/2019</a:t>
+              <a:t>7/16/2019</a:t>
             </a:fld>
             <a:endParaRPr lang="en-US" dirty="0"/>
           </a:p>
@@ -926,7 +945,7 @@
           <a:p>
             <a:fld id="{8CE62417-84E5-4A58-8223-BAF15DAC8247}" type="datetimeFigureOut">
               <a:rPr lang="en-US" smtClean="0"/>
-              <a:t>7/15/2019</a:t>
+              <a:t>7/16/2019</a:t>
             </a:fld>
             <a:endParaRPr lang="en-US" dirty="0"/>
           </a:p>
@@ -1201,7 +1220,7 @@
           <a:p>
             <a:fld id="{8CE62417-84E5-4A58-8223-BAF15DAC8247}" type="datetimeFigureOut">
               <a:rPr lang="en-US" smtClean="0"/>
-              <a:t>7/15/2019</a:t>
+              <a:t>7/16/2019</a:t>
             </a:fld>
             <a:endParaRPr lang="en-US" dirty="0"/>
           </a:p>
@@ -1466,7 +1485,7 @@
           <a:p>
             <a:fld id="{8CE62417-84E5-4A58-8223-BAF15DAC8247}" type="datetimeFigureOut">
               <a:rPr lang="en-US" smtClean="0"/>
-              <a:t>7/15/2019</a:t>
+              <a:t>7/16/2019</a:t>
             </a:fld>
             <a:endParaRPr lang="en-US" dirty="0"/>
           </a:p>
@@ -1878,7 +1897,7 @@
           <a:p>
             <a:fld id="{8CE62417-84E5-4A58-8223-BAF15DAC8247}" type="datetimeFigureOut">
               <a:rPr lang="en-US" smtClean="0"/>
-              <a:t>7/15/2019</a:t>
+              <a:t>7/16/2019</a:t>
             </a:fld>
             <a:endParaRPr lang="en-US" dirty="0"/>
           </a:p>
@@ -2019,7 +2038,7 @@
           <a:p>
             <a:fld id="{8CE62417-84E5-4A58-8223-BAF15DAC8247}" type="datetimeFigureOut">
               <a:rPr lang="en-US" smtClean="0"/>
-              <a:t>7/15/2019</a:t>
+              <a:t>7/16/2019</a:t>
             </a:fld>
             <a:endParaRPr lang="en-US" dirty="0"/>
           </a:p>
@@ -2132,7 +2151,7 @@
           <a:p>
             <a:fld id="{8CE62417-84E5-4A58-8223-BAF15DAC8247}" type="datetimeFigureOut">
               <a:rPr lang="en-US" smtClean="0"/>
-              <a:t>7/15/2019</a:t>
+              <a:t>7/16/2019</a:t>
             </a:fld>
             <a:endParaRPr lang="en-US" dirty="0"/>
           </a:p>
@@ -2443,7 +2462,7 @@
           <a:p>
             <a:fld id="{8CE62417-84E5-4A58-8223-BAF15DAC8247}" type="datetimeFigureOut">
               <a:rPr lang="en-US" smtClean="0"/>
-              <a:t>7/15/2019</a:t>
+              <a:t>7/16/2019</a:t>
             </a:fld>
             <a:endParaRPr lang="en-US" dirty="0"/>
           </a:p>
@@ -2731,7 +2750,7 @@
           <a:p>
             <a:fld id="{8CE62417-84E5-4A58-8223-BAF15DAC8247}" type="datetimeFigureOut">
               <a:rPr lang="en-US" smtClean="0"/>
-              <a:t>7/15/2019</a:t>
+              <a:t>7/16/2019</a:t>
             </a:fld>
             <a:endParaRPr lang="en-US" dirty="0"/>
           </a:p>
@@ -2972,7 +2991,7 @@
           <a:p>
             <a:fld id="{8CE62417-84E5-4A58-8223-BAF15DAC8247}" type="datetimeFigureOut">
               <a:rPr lang="en-US" smtClean="0"/>
-              <a:t>7/15/2019</a:t>
+              <a:t>7/16/2019</a:t>
             </a:fld>
             <a:endParaRPr lang="en-US" dirty="0"/>
           </a:p>
@@ -14933,6 +14952,704 @@
 </p:sld>
 </file>
 
+<file path=ppt/slides/slide65.xml><?xml version="1.0" encoding="utf-8"?>
+<p:sld xmlns:a="http://schemas.openxmlformats.org/drawingml/2006/main" xmlns:r="http://schemas.openxmlformats.org/officeDocument/2006/relationships" xmlns:p="http://schemas.openxmlformats.org/presentationml/2006/main">
+  <p:cSld>
+    <p:spTree>
+      <p:nvGrpSpPr>
+        <p:cNvPr id="1" name=""/>
+        <p:cNvGrpSpPr/>
+        <p:nvPr/>
+      </p:nvGrpSpPr>
+      <p:grpSpPr>
+        <a:xfrm>
+          <a:off x="0" y="0"/>
+          <a:ext cx="0" cy="0"/>
+          <a:chOff x="0" y="0"/>
+          <a:chExt cx="0" cy="0"/>
+        </a:xfrm>
+      </p:grpSpPr>
+      <p:sp>
+        <p:nvSpPr>
+          <p:cNvPr id="4" name="Title 3"/>
+          <p:cNvSpPr>
+            <a:spLocks noGrp="1"/>
+          </p:cNvSpPr>
+          <p:nvPr>
+            <p:ph type="title"/>
+          </p:nvPr>
+        </p:nvSpPr>
+        <p:spPr/>
+        <p:txBody>
+          <a:bodyPr/>
+          <a:lstStyle/>
+          <a:p>
+            <a:r>
+              <a:rPr lang="en-CA" dirty="0" smtClean="0"/>
+              <a:t>Sequential circuit design</a:t>
+            </a:r>
+            <a:endParaRPr lang="en-CA" dirty="0"/>
+          </a:p>
+        </p:txBody>
+      </p:sp>
+      <p:sp>
+        <p:nvSpPr>
+          <p:cNvPr id="5" name="Text Placeholder 4"/>
+          <p:cNvSpPr>
+            <a:spLocks noGrp="1"/>
+          </p:cNvSpPr>
+          <p:nvPr>
+            <p:ph type="body" idx="1"/>
+          </p:nvPr>
+        </p:nvSpPr>
+        <p:spPr/>
+        <p:txBody>
+          <a:bodyPr/>
+          <a:lstStyle/>
+          <a:p>
+            <a:endParaRPr lang="en-CA"/>
+          </a:p>
+        </p:txBody>
+      </p:sp>
+    </p:spTree>
+    <p:extLst>
+      <p:ext uri="{BB962C8B-B14F-4D97-AF65-F5344CB8AC3E}">
+        <p14:creationId xmlns:p14="http://schemas.microsoft.com/office/powerpoint/2010/main" val="1895135415"/>
+      </p:ext>
+    </p:extLst>
+  </p:cSld>
+  <p:clrMapOvr>
+    <a:masterClrMapping/>
+  </p:clrMapOvr>
+</p:sld>
+</file>
+
+<file path=ppt/slides/slide66.xml><?xml version="1.0" encoding="utf-8"?>
+<p:sld xmlns:a="http://schemas.openxmlformats.org/drawingml/2006/main" xmlns:r="http://schemas.openxmlformats.org/officeDocument/2006/relationships" xmlns:p="http://schemas.openxmlformats.org/presentationml/2006/main">
+  <p:cSld>
+    <p:spTree>
+      <p:nvGrpSpPr>
+        <p:cNvPr id="1" name=""/>
+        <p:cNvGrpSpPr/>
+        <p:nvPr/>
+      </p:nvGrpSpPr>
+      <p:grpSpPr>
+        <a:xfrm>
+          <a:off x="0" y="0"/>
+          <a:ext cx="0" cy="0"/>
+          <a:chOff x="0" y="0"/>
+          <a:chExt cx="0" cy="0"/>
+        </a:xfrm>
+      </p:grpSpPr>
+      <p:sp>
+        <p:nvSpPr>
+          <p:cNvPr id="4" name="Title 3"/>
+          <p:cNvSpPr>
+            <a:spLocks noGrp="1"/>
+          </p:cNvSpPr>
+          <p:nvPr>
+            <p:ph type="title"/>
+          </p:nvPr>
+        </p:nvSpPr>
+        <p:spPr/>
+        <p:txBody>
+          <a:bodyPr/>
+          <a:lstStyle/>
+          <a:p>
+            <a:r>
+              <a:rPr lang="en-CA" dirty="0"/>
+              <a:t>Sequential circuit design</a:t>
+            </a:r>
+          </a:p>
+        </p:txBody>
+      </p:sp>
+      <p:sp>
+        <p:nvSpPr>
+          <p:cNvPr id="5" name="Content Placeholder 4"/>
+          <p:cNvSpPr>
+            <a:spLocks noGrp="1"/>
+          </p:cNvSpPr>
+          <p:nvPr>
+            <p:ph idx="1"/>
+          </p:nvPr>
+        </p:nvSpPr>
+        <p:spPr/>
+        <p:txBody>
+          <a:bodyPr/>
+          <a:lstStyle/>
+          <a:p>
+            <a:r>
+              <a:rPr lang="en-CA" dirty="0"/>
+              <a:t>In </a:t>
+            </a:r>
+            <a:r>
+              <a:rPr lang="en-CA" dirty="0">
+                <a:solidFill>
+                  <a:srgbClr val="FF0000"/>
+                </a:solidFill>
+              </a:rPr>
+              <a:t>sequential circuit design</a:t>
+            </a:r>
+            <a:r>
+              <a:rPr lang="en-CA" dirty="0"/>
+              <a:t>, we turn some description into a working circuit </a:t>
+            </a:r>
+            <a:endParaRPr lang="en-CA" dirty="0" smtClean="0"/>
+          </a:p>
+          <a:p>
+            <a:pPr marL="457200" lvl="1" indent="0">
+              <a:buNone/>
+            </a:pPr>
+            <a:r>
+              <a:rPr lang="en-CA" dirty="0" smtClean="0"/>
+              <a:t>– </a:t>
+            </a:r>
+            <a:r>
+              <a:rPr lang="en-CA" dirty="0"/>
+              <a:t>We first make a state table or diagram to express the computation – Then we can turn that table or diagram into a sequential circuit</a:t>
+            </a:r>
+          </a:p>
+        </p:txBody>
+      </p:sp>
+      <p:pic>
+        <p:nvPicPr>
+          <p:cNvPr id="6" name="Picture 5"/>
+          <p:cNvPicPr>
+            <a:picLocks noChangeAspect="1"/>
+          </p:cNvPicPr>
+          <p:nvPr/>
+        </p:nvPicPr>
+        <p:blipFill>
+          <a:blip r:embed="rId2"/>
+          <a:stretch>
+            <a:fillRect/>
+          </a:stretch>
+        </p:blipFill>
+        <p:spPr>
+          <a:xfrm>
+            <a:off x="4169538" y="3739057"/>
+            <a:ext cx="3876675" cy="2657475"/>
+          </a:xfrm>
+          <a:prstGeom prst="rect">
+            <a:avLst/>
+          </a:prstGeom>
+        </p:spPr>
+      </p:pic>
+    </p:spTree>
+    <p:extLst>
+      <p:ext uri="{BB962C8B-B14F-4D97-AF65-F5344CB8AC3E}">
+        <p14:creationId xmlns:p14="http://schemas.microsoft.com/office/powerpoint/2010/main" val="76946160"/>
+      </p:ext>
+    </p:extLst>
+  </p:cSld>
+  <p:clrMapOvr>
+    <a:masterClrMapping/>
+  </p:clrMapOvr>
+</p:sld>
+</file>
+
+<file path=ppt/slides/slide67.xml><?xml version="1.0" encoding="utf-8"?>
+<p:sld xmlns:a="http://schemas.openxmlformats.org/drawingml/2006/main" xmlns:r="http://schemas.openxmlformats.org/officeDocument/2006/relationships" xmlns:p="http://schemas.openxmlformats.org/presentationml/2006/main">
+  <p:cSld>
+    <p:spTree>
+      <p:nvGrpSpPr>
+        <p:cNvPr id="1" name=""/>
+        <p:cNvGrpSpPr/>
+        <p:nvPr/>
+      </p:nvGrpSpPr>
+      <p:grpSpPr>
+        <a:xfrm>
+          <a:off x="0" y="0"/>
+          <a:ext cx="0" cy="0"/>
+          <a:chOff x="0" y="0"/>
+          <a:chExt cx="0" cy="0"/>
+        </a:xfrm>
+      </p:grpSpPr>
+      <p:sp>
+        <p:nvSpPr>
+          <p:cNvPr id="2" name="Title 1"/>
+          <p:cNvSpPr>
+            <a:spLocks noGrp="1"/>
+          </p:cNvSpPr>
+          <p:nvPr>
+            <p:ph type="title"/>
+          </p:nvPr>
+        </p:nvSpPr>
+        <p:spPr/>
+        <p:txBody>
+          <a:bodyPr/>
+          <a:lstStyle/>
+          <a:p>
+            <a:r>
+              <a:rPr lang="en-CA" dirty="0"/>
+              <a:t>Sequential circuit design procedure </a:t>
+            </a:r>
+          </a:p>
+        </p:txBody>
+      </p:sp>
+      <p:sp>
+        <p:nvSpPr>
+          <p:cNvPr id="3" name="Content Placeholder 2"/>
+          <p:cNvSpPr>
+            <a:spLocks noGrp="1"/>
+          </p:cNvSpPr>
+          <p:nvPr>
+            <p:ph idx="1"/>
+          </p:nvPr>
+        </p:nvSpPr>
+        <p:spPr>
+          <a:xfrm>
+            <a:off x="838200" y="1638795"/>
+            <a:ext cx="10515600" cy="5219205"/>
+          </a:xfrm>
+        </p:spPr>
+        <p:txBody>
+          <a:bodyPr>
+            <a:normAutofit fontScale="92500" lnSpcReduction="10000"/>
+          </a:bodyPr>
+          <a:lstStyle/>
+          <a:p>
+            <a:pPr marL="0" indent="0">
+              <a:buNone/>
+            </a:pPr>
+            <a:r>
+              <a:rPr lang="en-CA" u="sng" dirty="0"/>
+              <a:t>Step 1: </a:t>
+            </a:r>
+            <a:endParaRPr lang="en-CA" u="sng" dirty="0" smtClean="0"/>
+          </a:p>
+          <a:p>
+            <a:pPr marL="457200" lvl="1" indent="0">
+              <a:buNone/>
+            </a:pPr>
+            <a:r>
+              <a:rPr lang="en-CA" dirty="0" smtClean="0"/>
+              <a:t>Make </a:t>
+            </a:r>
+            <a:r>
+              <a:rPr lang="en-CA" dirty="0"/>
+              <a:t>a state table based on the problem statement. The table should show the present states, inputs, next states and outputs. (It may be easier to find a state diagram first, and then convert that to a table) </a:t>
+            </a:r>
+            <a:endParaRPr lang="en-CA" dirty="0" smtClean="0"/>
+          </a:p>
+          <a:p>
+            <a:pPr marL="0" indent="0">
+              <a:buNone/>
+            </a:pPr>
+            <a:r>
+              <a:rPr lang="en-CA" u="sng" dirty="0" smtClean="0"/>
+              <a:t>Step </a:t>
+            </a:r>
+            <a:r>
+              <a:rPr lang="en-CA" u="sng" dirty="0"/>
+              <a:t>2: </a:t>
+            </a:r>
+            <a:endParaRPr lang="en-CA" u="sng" dirty="0" smtClean="0"/>
+          </a:p>
+          <a:p>
+            <a:pPr marL="457200" lvl="1" indent="0">
+              <a:buNone/>
+            </a:pPr>
+            <a:r>
+              <a:rPr lang="en-CA" dirty="0" smtClean="0"/>
+              <a:t>Assign </a:t>
+            </a:r>
+            <a:r>
+              <a:rPr lang="en-CA" dirty="0"/>
+              <a:t>binary codes to the states in the state table, if you haven’t already. </a:t>
+            </a:r>
+            <a:endParaRPr lang="en-CA" dirty="0" smtClean="0"/>
+          </a:p>
+          <a:p>
+            <a:pPr marL="0" indent="0">
+              <a:buNone/>
+            </a:pPr>
+            <a:r>
+              <a:rPr lang="en-CA" u="sng" dirty="0" smtClean="0"/>
+              <a:t>Step 3: </a:t>
+            </a:r>
+          </a:p>
+          <a:p>
+            <a:pPr marL="457200" lvl="1" indent="0">
+              <a:buNone/>
+            </a:pPr>
+            <a:r>
+              <a:rPr lang="en-CA" dirty="0" smtClean="0"/>
+              <a:t>For </a:t>
+            </a:r>
+            <a:r>
+              <a:rPr lang="en-CA" dirty="0"/>
+              <a:t>each flip-flop and each row of your state table, find the flip-flop input values that are needed to generate the next state from the present state. You can use flip-flop excitation tables here. </a:t>
+            </a:r>
+            <a:endParaRPr lang="en-CA" dirty="0" smtClean="0"/>
+          </a:p>
+          <a:p>
+            <a:pPr marL="0" indent="0">
+              <a:buNone/>
+            </a:pPr>
+            <a:r>
+              <a:rPr lang="en-CA" u="sng" dirty="0" smtClean="0"/>
+              <a:t>Step </a:t>
+            </a:r>
+            <a:r>
+              <a:rPr lang="en-CA" u="sng" dirty="0"/>
+              <a:t>4: </a:t>
+            </a:r>
+            <a:endParaRPr lang="en-CA" u="sng" dirty="0" smtClean="0"/>
+          </a:p>
+          <a:p>
+            <a:pPr marL="457200" lvl="1" indent="0">
+              <a:buNone/>
+            </a:pPr>
+            <a:r>
+              <a:rPr lang="en-CA" dirty="0" smtClean="0"/>
+              <a:t>Find </a:t>
+            </a:r>
+            <a:r>
+              <a:rPr lang="en-CA" dirty="0"/>
+              <a:t>simplified equations for the flip-flop inputs and the outputs. </a:t>
+            </a:r>
+            <a:endParaRPr lang="en-CA" dirty="0" smtClean="0"/>
+          </a:p>
+          <a:p>
+            <a:pPr marL="0" indent="0">
+              <a:buNone/>
+            </a:pPr>
+            <a:r>
+              <a:rPr lang="en-CA" u="sng" dirty="0" smtClean="0"/>
+              <a:t>Step </a:t>
+            </a:r>
+            <a:r>
+              <a:rPr lang="en-CA" u="sng" dirty="0"/>
+              <a:t>5:</a:t>
+            </a:r>
+            <a:r>
+              <a:rPr lang="en-CA" dirty="0"/>
+              <a:t> </a:t>
+            </a:r>
+            <a:endParaRPr lang="en-CA" dirty="0" smtClean="0"/>
+          </a:p>
+          <a:p>
+            <a:pPr marL="457200" lvl="1" indent="0">
+              <a:buNone/>
+            </a:pPr>
+            <a:r>
+              <a:rPr lang="en-CA" dirty="0" smtClean="0"/>
+              <a:t>Build </a:t>
+            </a:r>
+            <a:r>
+              <a:rPr lang="en-CA" dirty="0"/>
+              <a:t>the circuit!</a:t>
+            </a:r>
+          </a:p>
+        </p:txBody>
+      </p:sp>
+    </p:spTree>
+    <p:extLst>
+      <p:ext uri="{BB962C8B-B14F-4D97-AF65-F5344CB8AC3E}">
+        <p14:creationId xmlns:p14="http://schemas.microsoft.com/office/powerpoint/2010/main" val="3721307712"/>
+      </p:ext>
+    </p:extLst>
+  </p:cSld>
+  <p:clrMapOvr>
+    <a:masterClrMapping/>
+  </p:clrMapOvr>
+</p:sld>
+</file>
+
+<file path=ppt/slides/slide68.xml><?xml version="1.0" encoding="utf-8"?>
+<p:sld xmlns:a="http://schemas.openxmlformats.org/drawingml/2006/main" xmlns:r="http://schemas.openxmlformats.org/officeDocument/2006/relationships" xmlns:p="http://schemas.openxmlformats.org/presentationml/2006/main">
+  <p:cSld>
+    <p:spTree>
+      <p:nvGrpSpPr>
+        <p:cNvPr id="1" name=""/>
+        <p:cNvGrpSpPr/>
+        <p:nvPr/>
+      </p:nvGrpSpPr>
+      <p:grpSpPr>
+        <a:xfrm>
+          <a:off x="0" y="0"/>
+          <a:ext cx="0" cy="0"/>
+          <a:chOff x="0" y="0"/>
+          <a:chExt cx="0" cy="0"/>
+        </a:xfrm>
+      </p:grpSpPr>
+      <p:sp>
+        <p:nvSpPr>
+          <p:cNvPr id="2" name="Title 1"/>
+          <p:cNvSpPr>
+            <a:spLocks noGrp="1"/>
+          </p:cNvSpPr>
+          <p:nvPr>
+            <p:ph type="title"/>
+          </p:nvPr>
+        </p:nvSpPr>
+        <p:spPr/>
+        <p:txBody>
+          <a:bodyPr/>
+          <a:lstStyle/>
+          <a:p>
+            <a:r>
+              <a:rPr lang="en-CA" dirty="0"/>
+              <a:t>Sequence recognizers</a:t>
+            </a:r>
+          </a:p>
+        </p:txBody>
+      </p:sp>
+      <p:sp>
+        <p:nvSpPr>
+          <p:cNvPr id="3" name="Content Placeholder 2"/>
+          <p:cNvSpPr>
+            <a:spLocks noGrp="1"/>
+          </p:cNvSpPr>
+          <p:nvPr>
+            <p:ph idx="1"/>
+          </p:nvPr>
+        </p:nvSpPr>
+        <p:spPr>
+          <a:xfrm>
+            <a:off x="838200" y="1825624"/>
+            <a:ext cx="10515600" cy="4812681"/>
+          </a:xfrm>
+        </p:spPr>
+        <p:txBody>
+          <a:bodyPr>
+            <a:normAutofit fontScale="92500" lnSpcReduction="20000"/>
+          </a:bodyPr>
+          <a:lstStyle/>
+          <a:p>
+            <a:r>
+              <a:rPr lang="en-CA" dirty="0"/>
+              <a:t>A sequence recognizer is a special kind of sequential circuit that looks for a special bit pattern in some input </a:t>
+            </a:r>
+            <a:endParaRPr lang="en-CA" dirty="0" smtClean="0"/>
+          </a:p>
+          <a:p>
+            <a:r>
+              <a:rPr lang="en-CA" dirty="0" smtClean="0"/>
+              <a:t>The </a:t>
+            </a:r>
+            <a:r>
+              <a:rPr lang="en-CA" dirty="0"/>
+              <a:t>recognizer circuit has only one input, X </a:t>
+            </a:r>
+            <a:endParaRPr lang="en-CA" dirty="0" smtClean="0"/>
+          </a:p>
+          <a:p>
+            <a:pPr marL="457200" lvl="1" indent="0">
+              <a:buNone/>
+            </a:pPr>
+            <a:r>
+              <a:rPr lang="en-CA" dirty="0" smtClean="0"/>
+              <a:t>– </a:t>
+            </a:r>
+            <a:r>
+              <a:rPr lang="en-CA" dirty="0"/>
+              <a:t>One bit of input is supplied on every clock cycle </a:t>
+            </a:r>
+            <a:endParaRPr lang="en-CA" dirty="0" smtClean="0"/>
+          </a:p>
+          <a:p>
+            <a:pPr marL="457200" lvl="1" indent="0">
+              <a:buNone/>
+            </a:pPr>
+            <a:r>
+              <a:rPr lang="en-CA" dirty="0" smtClean="0"/>
+              <a:t>– </a:t>
+            </a:r>
+            <a:r>
+              <a:rPr lang="en-CA" dirty="0"/>
+              <a:t>This is an easy way to permit arbitrarily long input sequences </a:t>
+            </a:r>
+          </a:p>
+          <a:p>
+            <a:r>
+              <a:rPr lang="en-CA" dirty="0" smtClean="0"/>
+              <a:t>There </a:t>
+            </a:r>
+            <a:r>
+              <a:rPr lang="en-CA" dirty="0"/>
+              <a:t>is one output, Z, which is 1 when the desired pattern is </a:t>
+            </a:r>
+            <a:r>
+              <a:rPr lang="en-CA" dirty="0" smtClean="0"/>
+              <a:t>found</a:t>
+            </a:r>
+          </a:p>
+          <a:p>
+            <a:r>
+              <a:rPr lang="en-CA" dirty="0" smtClean="0"/>
+              <a:t>Our </a:t>
+            </a:r>
+            <a:r>
+              <a:rPr lang="en-CA" dirty="0"/>
+              <a:t>example will detect the bit pattern “1001”: </a:t>
+            </a:r>
+            <a:endParaRPr lang="en-CA" dirty="0" smtClean="0"/>
+          </a:p>
+          <a:p>
+            <a:endParaRPr lang="en-CA" dirty="0" smtClean="0"/>
+          </a:p>
+          <a:p>
+            <a:endParaRPr lang="en-CA" dirty="0"/>
+          </a:p>
+          <a:p>
+            <a:r>
+              <a:rPr lang="en-CA" dirty="0"/>
+              <a:t>A sequential circuit is required because the circuit has to “remember” the inputs from previous clock cycles, in order to determine whether or not a match was found</a:t>
+            </a:r>
+          </a:p>
+        </p:txBody>
+      </p:sp>
+      <p:pic>
+        <p:nvPicPr>
+          <p:cNvPr id="4" name="Picture 3"/>
+          <p:cNvPicPr>
+            <a:picLocks noChangeAspect="1"/>
+          </p:cNvPicPr>
+          <p:nvPr/>
+        </p:nvPicPr>
+        <p:blipFill>
+          <a:blip r:embed="rId2"/>
+          <a:stretch>
+            <a:fillRect/>
+          </a:stretch>
+        </p:blipFill>
+        <p:spPr>
+          <a:xfrm>
+            <a:off x="3634591" y="4658528"/>
+            <a:ext cx="4305300" cy="581025"/>
+          </a:xfrm>
+          <a:prstGeom prst="rect">
+            <a:avLst/>
+          </a:prstGeom>
+        </p:spPr>
+      </p:pic>
+    </p:spTree>
+    <p:extLst>
+      <p:ext uri="{BB962C8B-B14F-4D97-AF65-F5344CB8AC3E}">
+        <p14:creationId xmlns:p14="http://schemas.microsoft.com/office/powerpoint/2010/main" val="3519794229"/>
+      </p:ext>
+    </p:extLst>
+  </p:cSld>
+  <p:clrMapOvr>
+    <a:masterClrMapping/>
+  </p:clrMapOvr>
+</p:sld>
+</file>
+
+<file path=ppt/slides/slide69.xml><?xml version="1.0" encoding="utf-8"?>
+<p:sld xmlns:a="http://schemas.openxmlformats.org/drawingml/2006/main" xmlns:r="http://schemas.openxmlformats.org/officeDocument/2006/relationships" xmlns:p="http://schemas.openxmlformats.org/presentationml/2006/main">
+  <p:cSld>
+    <p:spTree>
+      <p:nvGrpSpPr>
+        <p:cNvPr id="1" name=""/>
+        <p:cNvGrpSpPr/>
+        <p:nvPr/>
+      </p:nvGrpSpPr>
+      <p:grpSpPr>
+        <a:xfrm>
+          <a:off x="0" y="0"/>
+          <a:ext cx="0" cy="0"/>
+          <a:chOff x="0" y="0"/>
+          <a:chExt cx="0" cy="0"/>
+        </a:xfrm>
+      </p:grpSpPr>
+      <p:sp>
+        <p:nvSpPr>
+          <p:cNvPr id="2" name="Title 1"/>
+          <p:cNvSpPr>
+            <a:spLocks noGrp="1"/>
+          </p:cNvSpPr>
+          <p:nvPr>
+            <p:ph type="title"/>
+          </p:nvPr>
+        </p:nvSpPr>
+        <p:spPr/>
+        <p:txBody>
+          <a:bodyPr/>
+          <a:lstStyle/>
+          <a:p>
+            <a:r>
+              <a:rPr lang="en-CA" dirty="0"/>
+              <a:t>Step 1: Making a state table</a:t>
+            </a:r>
+          </a:p>
+        </p:txBody>
+      </p:sp>
+      <p:sp>
+        <p:nvSpPr>
+          <p:cNvPr id="3" name="Content Placeholder 2"/>
+          <p:cNvSpPr>
+            <a:spLocks noGrp="1"/>
+          </p:cNvSpPr>
+          <p:nvPr>
+            <p:ph idx="1"/>
+          </p:nvPr>
+        </p:nvSpPr>
+        <p:spPr/>
+        <p:txBody>
+          <a:bodyPr/>
+          <a:lstStyle/>
+          <a:p>
+            <a:r>
+              <a:rPr lang="en-CA" dirty="0"/>
+              <a:t>The first thing you have to figure out is precisely how the use of state will help you solve the given problem </a:t>
+            </a:r>
+            <a:endParaRPr lang="en-CA" dirty="0" smtClean="0"/>
+          </a:p>
+          <a:p>
+            <a:pPr marL="457200" lvl="1" indent="0">
+              <a:buNone/>
+            </a:pPr>
+            <a:r>
+              <a:rPr lang="en-CA" dirty="0" smtClean="0"/>
+              <a:t>– </a:t>
+            </a:r>
+            <a:r>
+              <a:rPr lang="en-CA" dirty="0"/>
+              <a:t>Make a state table based on the problem statement. The table should show the present states, inputs, next states and outputs </a:t>
+            </a:r>
+            <a:endParaRPr lang="en-CA" dirty="0" smtClean="0"/>
+          </a:p>
+          <a:p>
+            <a:pPr marL="457200" lvl="1" indent="0">
+              <a:buNone/>
+            </a:pPr>
+            <a:r>
+              <a:rPr lang="en-CA" dirty="0" smtClean="0"/>
+              <a:t>– </a:t>
+            </a:r>
+            <a:r>
+              <a:rPr lang="en-CA" dirty="0"/>
+              <a:t>Sometimes it is easier to first find a state diagram and then convert that to a table </a:t>
+            </a:r>
+          </a:p>
+          <a:p>
+            <a:r>
+              <a:rPr lang="en-CA" dirty="0" smtClean="0"/>
+              <a:t>This </a:t>
+            </a:r>
+            <a:r>
+              <a:rPr lang="en-CA" dirty="0"/>
+              <a:t>is usually the most difficult step. Once you have the state table, the rest of the design procedure is the same for all sequential circuits</a:t>
+            </a:r>
+          </a:p>
+        </p:txBody>
+      </p:sp>
+    </p:spTree>
+    <p:extLst>
+      <p:ext uri="{BB962C8B-B14F-4D97-AF65-F5344CB8AC3E}">
+        <p14:creationId xmlns:p14="http://schemas.microsoft.com/office/powerpoint/2010/main" val="1304689302"/>
+      </p:ext>
+    </p:extLst>
+  </p:cSld>
+  <p:clrMapOvr>
+    <a:masterClrMapping/>
+  </p:clrMapOvr>
+</p:sld>
+</file>
+
 <file path=ppt/slides/slide7.xml><?xml version="1.0" encoding="utf-8"?>
 <p:sld xmlns:a="http://schemas.openxmlformats.org/drawingml/2006/main" xmlns:r="http://schemas.openxmlformats.org/officeDocument/2006/relationships" xmlns:p="http://schemas.openxmlformats.org/presentationml/2006/main">
   <p:cSld>
@@ -15061,6 +15778,1476 @@
 </p:sld>
 </file>
 
+<file path=ppt/slides/slide70.xml><?xml version="1.0" encoding="utf-8"?>
+<p:sld xmlns:a="http://schemas.openxmlformats.org/drawingml/2006/main" xmlns:r="http://schemas.openxmlformats.org/officeDocument/2006/relationships" xmlns:p="http://schemas.openxmlformats.org/presentationml/2006/main">
+  <p:cSld>
+    <p:spTree>
+      <p:nvGrpSpPr>
+        <p:cNvPr id="1" name=""/>
+        <p:cNvGrpSpPr/>
+        <p:nvPr/>
+      </p:nvGrpSpPr>
+      <p:grpSpPr>
+        <a:xfrm>
+          <a:off x="0" y="0"/>
+          <a:ext cx="0" cy="0"/>
+          <a:chOff x="0" y="0"/>
+          <a:chExt cx="0" cy="0"/>
+        </a:xfrm>
+      </p:grpSpPr>
+      <p:sp>
+        <p:nvSpPr>
+          <p:cNvPr id="2" name="Title 1"/>
+          <p:cNvSpPr>
+            <a:spLocks noGrp="1"/>
+          </p:cNvSpPr>
+          <p:nvPr>
+            <p:ph type="title"/>
+          </p:nvPr>
+        </p:nvSpPr>
+        <p:spPr/>
+        <p:txBody>
+          <a:bodyPr/>
+          <a:lstStyle/>
+          <a:p>
+            <a:r>
+              <a:rPr lang="en-CA" dirty="0"/>
+              <a:t>A basic state diagram</a:t>
+            </a:r>
+          </a:p>
+        </p:txBody>
+      </p:sp>
+      <p:sp>
+        <p:nvSpPr>
+          <p:cNvPr id="3" name="Content Placeholder 2"/>
+          <p:cNvSpPr>
+            <a:spLocks noGrp="1"/>
+          </p:cNvSpPr>
+          <p:nvPr>
+            <p:ph idx="1"/>
+          </p:nvPr>
+        </p:nvSpPr>
+        <p:spPr>
+          <a:xfrm>
+            <a:off x="838200" y="1599996"/>
+            <a:ext cx="10515600" cy="4351338"/>
+          </a:xfrm>
+        </p:spPr>
+        <p:txBody>
+          <a:bodyPr/>
+          <a:lstStyle/>
+          <a:p>
+            <a:r>
+              <a:rPr lang="en-CA" dirty="0"/>
+              <a:t>What state do we need for the sequence recognizer? </a:t>
+            </a:r>
+            <a:endParaRPr lang="en-CA" dirty="0" smtClean="0"/>
+          </a:p>
+          <a:p>
+            <a:pPr marL="457200" lvl="1" indent="0">
+              <a:buNone/>
+            </a:pPr>
+            <a:r>
+              <a:rPr lang="en-CA" dirty="0" smtClean="0"/>
+              <a:t>– </a:t>
+            </a:r>
+            <a:r>
+              <a:rPr lang="en-CA" dirty="0"/>
+              <a:t>We have to “remember” inputs from previous clock cycles </a:t>
+            </a:r>
+            <a:endParaRPr lang="en-CA" dirty="0" smtClean="0"/>
+          </a:p>
+          <a:p>
+            <a:pPr marL="457200" lvl="1" indent="0">
+              <a:buNone/>
+            </a:pPr>
+            <a:r>
+              <a:rPr lang="en-CA" dirty="0" smtClean="0"/>
+              <a:t>– </a:t>
+            </a:r>
+            <a:r>
+              <a:rPr lang="en-CA" dirty="0"/>
+              <a:t>For example, if the previous three inputs were 100 and the current input is 1, then the output should be 1 </a:t>
+            </a:r>
+            <a:endParaRPr lang="en-CA" dirty="0" smtClean="0"/>
+          </a:p>
+          <a:p>
+            <a:pPr marL="457200" lvl="1" indent="0">
+              <a:buNone/>
+            </a:pPr>
+            <a:r>
+              <a:rPr lang="en-CA" dirty="0" smtClean="0"/>
+              <a:t>– </a:t>
+            </a:r>
+            <a:r>
+              <a:rPr lang="en-CA" dirty="0"/>
+              <a:t>In general, we will have to remember occurrences of parts of the desired pattern—in this case, 1, 10, and 100 </a:t>
+            </a:r>
+            <a:endParaRPr lang="en-CA" dirty="0" smtClean="0"/>
+          </a:p>
+          <a:p>
+            <a:r>
+              <a:rPr lang="en-CA" dirty="0" smtClean="0"/>
+              <a:t>We’ll </a:t>
+            </a:r>
+            <a:r>
+              <a:rPr lang="en-CA" dirty="0"/>
+              <a:t>start with a basic state diagram:</a:t>
+            </a:r>
+          </a:p>
+        </p:txBody>
+      </p:sp>
+      <p:pic>
+        <p:nvPicPr>
+          <p:cNvPr id="4" name="Picture 3"/>
+          <p:cNvPicPr>
+            <a:picLocks noChangeAspect="1"/>
+          </p:cNvPicPr>
+          <p:nvPr/>
+        </p:nvPicPr>
+        <p:blipFill>
+          <a:blip r:embed="rId2"/>
+          <a:stretch>
+            <a:fillRect/>
+          </a:stretch>
+        </p:blipFill>
+        <p:spPr>
+          <a:xfrm>
+            <a:off x="2173184" y="4428355"/>
+            <a:ext cx="7423037" cy="2304953"/>
+          </a:xfrm>
+          <a:prstGeom prst="rect">
+            <a:avLst/>
+          </a:prstGeom>
+        </p:spPr>
+      </p:pic>
+    </p:spTree>
+    <p:extLst>
+      <p:ext uri="{BB962C8B-B14F-4D97-AF65-F5344CB8AC3E}">
+        <p14:creationId xmlns:p14="http://schemas.microsoft.com/office/powerpoint/2010/main" val="1728814256"/>
+      </p:ext>
+    </p:extLst>
+  </p:cSld>
+  <p:clrMapOvr>
+    <a:masterClrMapping/>
+  </p:clrMapOvr>
+</p:sld>
+</file>
+
+<file path=ppt/slides/slide71.xml><?xml version="1.0" encoding="utf-8"?>
+<p:sld xmlns:a="http://schemas.openxmlformats.org/drawingml/2006/main" xmlns:r="http://schemas.openxmlformats.org/officeDocument/2006/relationships" xmlns:p="http://schemas.openxmlformats.org/presentationml/2006/main">
+  <p:cSld>
+    <p:spTree>
+      <p:nvGrpSpPr>
+        <p:cNvPr id="1" name=""/>
+        <p:cNvGrpSpPr/>
+        <p:nvPr/>
+      </p:nvGrpSpPr>
+      <p:grpSpPr>
+        <a:xfrm>
+          <a:off x="0" y="0"/>
+          <a:ext cx="0" cy="0"/>
+          <a:chOff x="0" y="0"/>
+          <a:chExt cx="0" cy="0"/>
+        </a:xfrm>
+      </p:grpSpPr>
+      <p:sp>
+        <p:nvSpPr>
+          <p:cNvPr id="2" name="Title 1"/>
+          <p:cNvSpPr>
+            <a:spLocks noGrp="1"/>
+          </p:cNvSpPr>
+          <p:nvPr>
+            <p:ph type="title"/>
+          </p:nvPr>
+        </p:nvSpPr>
+        <p:spPr/>
+        <p:txBody>
+          <a:bodyPr/>
+          <a:lstStyle/>
+          <a:p>
+            <a:r>
+              <a:rPr lang="en-CA" dirty="0"/>
+              <a:t>Overlapping occurrences of the pattern</a:t>
+            </a:r>
+          </a:p>
+        </p:txBody>
+      </p:sp>
+      <p:sp>
+        <p:nvSpPr>
+          <p:cNvPr id="3" name="Content Placeholder 2"/>
+          <p:cNvSpPr>
+            <a:spLocks noGrp="1"/>
+          </p:cNvSpPr>
+          <p:nvPr>
+            <p:ph idx="1"/>
+          </p:nvPr>
+        </p:nvSpPr>
+        <p:spPr/>
+        <p:txBody>
+          <a:bodyPr/>
+          <a:lstStyle/>
+          <a:p>
+            <a:r>
+              <a:rPr lang="en-CA" dirty="0"/>
+              <a:t>What happens if we’re in state D (the last three inputs were 100), and the current input is 1? </a:t>
+            </a:r>
+            <a:endParaRPr lang="en-CA" dirty="0" smtClean="0"/>
+          </a:p>
+          <a:p>
+            <a:pPr marL="457200" lvl="1" indent="0">
+              <a:buNone/>
+            </a:pPr>
+            <a:r>
+              <a:rPr lang="en-CA" dirty="0" smtClean="0"/>
+              <a:t>– </a:t>
+            </a:r>
+            <a:r>
+              <a:rPr lang="en-CA" dirty="0"/>
+              <a:t>The output should be a 1, because we’ve found the desired </a:t>
+            </a:r>
+            <a:r>
+              <a:rPr lang="en-CA" dirty="0" smtClean="0"/>
+              <a:t>pattern</a:t>
+            </a:r>
+          </a:p>
+          <a:p>
+            <a:pPr marL="457200" lvl="1" indent="0">
+              <a:buNone/>
+            </a:pPr>
+            <a:r>
+              <a:rPr lang="en-CA" dirty="0" smtClean="0"/>
+              <a:t>– </a:t>
+            </a:r>
+            <a:r>
+              <a:rPr lang="en-CA" dirty="0"/>
+              <a:t>But this last 1 could also be the start of another occurrence of the pattern! For example, </a:t>
+            </a:r>
+            <a:r>
+              <a:rPr lang="en-CA" dirty="0" smtClean="0"/>
+              <a:t>100</a:t>
+            </a:r>
+            <a:r>
+              <a:rPr lang="en-CA" dirty="0" smtClean="0">
+                <a:solidFill>
+                  <a:srgbClr val="1832F0"/>
+                </a:solidFill>
+              </a:rPr>
+              <a:t>1</a:t>
+            </a:r>
+            <a:r>
+              <a:rPr lang="en-CA" dirty="0" smtClean="0"/>
+              <a:t>001 </a:t>
+            </a:r>
+            <a:r>
+              <a:rPr lang="en-CA" dirty="0"/>
+              <a:t>contains two occurrences of 1001 </a:t>
+            </a:r>
+            <a:endParaRPr lang="en-CA" dirty="0" smtClean="0"/>
+          </a:p>
+          <a:p>
+            <a:pPr marL="457200" lvl="1" indent="0">
+              <a:buNone/>
+            </a:pPr>
+            <a:r>
+              <a:rPr lang="en-CA" dirty="0" smtClean="0"/>
+              <a:t>– </a:t>
+            </a:r>
+            <a:r>
+              <a:rPr lang="en-CA" dirty="0"/>
+              <a:t>To detect overlapping occurrences of the pattern, the next state should be B.</a:t>
+            </a:r>
+          </a:p>
+        </p:txBody>
+      </p:sp>
+      <p:pic>
+        <p:nvPicPr>
+          <p:cNvPr id="4" name="Picture 3"/>
+          <p:cNvPicPr>
+            <a:picLocks noChangeAspect="1"/>
+          </p:cNvPicPr>
+          <p:nvPr/>
+        </p:nvPicPr>
+        <p:blipFill>
+          <a:blip r:embed="rId2"/>
+          <a:stretch>
+            <a:fillRect/>
+          </a:stretch>
+        </p:blipFill>
+        <p:spPr>
+          <a:xfrm>
+            <a:off x="2735253" y="4299091"/>
+            <a:ext cx="6721494" cy="2385046"/>
+          </a:xfrm>
+          <a:prstGeom prst="rect">
+            <a:avLst/>
+          </a:prstGeom>
+        </p:spPr>
+      </p:pic>
+    </p:spTree>
+    <p:extLst>
+      <p:ext uri="{BB962C8B-B14F-4D97-AF65-F5344CB8AC3E}">
+        <p14:creationId xmlns:p14="http://schemas.microsoft.com/office/powerpoint/2010/main" val="2326470569"/>
+      </p:ext>
+    </p:extLst>
+  </p:cSld>
+  <p:clrMapOvr>
+    <a:masterClrMapping/>
+  </p:clrMapOvr>
+</p:sld>
+</file>
+
+<file path=ppt/slides/slide72.xml><?xml version="1.0" encoding="utf-8"?>
+<p:sld xmlns:a="http://schemas.openxmlformats.org/drawingml/2006/main" xmlns:r="http://schemas.openxmlformats.org/officeDocument/2006/relationships" xmlns:p="http://schemas.openxmlformats.org/presentationml/2006/main">
+  <p:cSld>
+    <p:spTree>
+      <p:nvGrpSpPr>
+        <p:cNvPr id="1" name=""/>
+        <p:cNvGrpSpPr/>
+        <p:nvPr/>
+      </p:nvGrpSpPr>
+      <p:grpSpPr>
+        <a:xfrm>
+          <a:off x="0" y="0"/>
+          <a:ext cx="0" cy="0"/>
+          <a:chOff x="0" y="0"/>
+          <a:chExt cx="0" cy="0"/>
+        </a:xfrm>
+      </p:grpSpPr>
+      <p:sp>
+        <p:nvSpPr>
+          <p:cNvPr id="2" name="Title 1"/>
+          <p:cNvSpPr>
+            <a:spLocks noGrp="1"/>
+          </p:cNvSpPr>
+          <p:nvPr>
+            <p:ph type="title"/>
+          </p:nvPr>
+        </p:nvSpPr>
+        <p:spPr/>
+        <p:txBody>
+          <a:bodyPr/>
+          <a:lstStyle/>
+          <a:p>
+            <a:r>
+              <a:rPr lang="en-CA" dirty="0" smtClean="0"/>
+              <a:t>Filling in the other arrows</a:t>
+            </a:r>
+            <a:endParaRPr lang="en-CA" dirty="0"/>
+          </a:p>
+        </p:txBody>
+      </p:sp>
+      <p:sp>
+        <p:nvSpPr>
+          <p:cNvPr id="3" name="Content Placeholder 2"/>
+          <p:cNvSpPr>
+            <a:spLocks noGrp="1"/>
+          </p:cNvSpPr>
+          <p:nvPr>
+            <p:ph idx="1"/>
+          </p:nvPr>
+        </p:nvSpPr>
+        <p:spPr/>
+        <p:txBody>
+          <a:bodyPr/>
+          <a:lstStyle/>
+          <a:p>
+            <a:r>
+              <a:rPr lang="en-CA" dirty="0"/>
+              <a:t>Two outgoing arrows for each node, to account for the possibilities of X=0 and </a:t>
+            </a:r>
+            <a:r>
+              <a:rPr lang="en-CA" dirty="0" smtClean="0"/>
+              <a:t>X=1</a:t>
+            </a:r>
+          </a:p>
+          <a:p>
+            <a:r>
+              <a:rPr lang="en-CA" dirty="0"/>
+              <a:t>The remaining arrows we need are shown in blue. They also allow for the correct detection of overlapping occurrences of 1001.</a:t>
+            </a:r>
+          </a:p>
+        </p:txBody>
+      </p:sp>
+      <p:pic>
+        <p:nvPicPr>
+          <p:cNvPr id="4" name="Picture 3"/>
+          <p:cNvPicPr>
+            <a:picLocks noChangeAspect="1"/>
+          </p:cNvPicPr>
+          <p:nvPr/>
+        </p:nvPicPr>
+        <p:blipFill>
+          <a:blip r:embed="rId2"/>
+          <a:stretch>
+            <a:fillRect/>
+          </a:stretch>
+        </p:blipFill>
+        <p:spPr>
+          <a:xfrm>
+            <a:off x="2869588" y="3524414"/>
+            <a:ext cx="6452824" cy="3274211"/>
+          </a:xfrm>
+          <a:prstGeom prst="rect">
+            <a:avLst/>
+          </a:prstGeom>
+        </p:spPr>
+      </p:pic>
+    </p:spTree>
+    <p:extLst>
+      <p:ext uri="{BB962C8B-B14F-4D97-AF65-F5344CB8AC3E}">
+        <p14:creationId xmlns:p14="http://schemas.microsoft.com/office/powerpoint/2010/main" val="283923554"/>
+      </p:ext>
+    </p:extLst>
+  </p:cSld>
+  <p:clrMapOvr>
+    <a:masterClrMapping/>
+  </p:clrMapOvr>
+</p:sld>
+</file>
+
+<file path=ppt/slides/slide73.xml><?xml version="1.0" encoding="utf-8"?>
+<p:sld xmlns:a="http://schemas.openxmlformats.org/drawingml/2006/main" xmlns:r="http://schemas.openxmlformats.org/officeDocument/2006/relationships" xmlns:p="http://schemas.openxmlformats.org/presentationml/2006/main">
+  <p:cSld>
+    <p:spTree>
+      <p:nvGrpSpPr>
+        <p:cNvPr id="1" name=""/>
+        <p:cNvGrpSpPr/>
+        <p:nvPr/>
+      </p:nvGrpSpPr>
+      <p:grpSpPr>
+        <a:xfrm>
+          <a:off x="0" y="0"/>
+          <a:ext cx="0" cy="0"/>
+          <a:chOff x="0" y="0"/>
+          <a:chExt cx="0" cy="0"/>
+        </a:xfrm>
+      </p:grpSpPr>
+      <p:sp>
+        <p:nvSpPr>
+          <p:cNvPr id="2" name="Title 1"/>
+          <p:cNvSpPr>
+            <a:spLocks noGrp="1"/>
+          </p:cNvSpPr>
+          <p:nvPr>
+            <p:ph type="title"/>
+          </p:nvPr>
+        </p:nvSpPr>
+        <p:spPr/>
+        <p:txBody>
+          <a:bodyPr/>
+          <a:lstStyle/>
+          <a:p>
+            <a:r>
+              <a:rPr lang="en-CA" dirty="0"/>
+              <a:t>Finally, making the state table</a:t>
+            </a:r>
+          </a:p>
+        </p:txBody>
+      </p:sp>
+      <p:sp>
+        <p:nvSpPr>
+          <p:cNvPr id="3" name="Content Placeholder 2"/>
+          <p:cNvSpPr>
+            <a:spLocks noGrp="1"/>
+          </p:cNvSpPr>
+          <p:nvPr>
+            <p:ph idx="1"/>
+          </p:nvPr>
+        </p:nvSpPr>
+        <p:spPr>
+          <a:xfrm>
+            <a:off x="838200" y="3705101"/>
+            <a:ext cx="4885706" cy="2471862"/>
+          </a:xfrm>
+        </p:spPr>
+        <p:txBody>
+          <a:bodyPr/>
+          <a:lstStyle/>
+          <a:p>
+            <a:pPr marL="0" indent="0">
+              <a:buNone/>
+            </a:pPr>
+            <a:r>
+              <a:rPr lang="en-CA" dirty="0"/>
+              <a:t>Remember how the state diagram arrows correspond to rows of the state table:</a:t>
+            </a:r>
+          </a:p>
+        </p:txBody>
+      </p:sp>
+      <p:pic>
+        <p:nvPicPr>
+          <p:cNvPr id="5" name="Picture 4"/>
+          <p:cNvPicPr>
+            <a:picLocks noChangeAspect="1"/>
+          </p:cNvPicPr>
+          <p:nvPr/>
+        </p:nvPicPr>
+        <p:blipFill>
+          <a:blip r:embed="rId2"/>
+          <a:stretch>
+            <a:fillRect/>
+          </a:stretch>
+        </p:blipFill>
+        <p:spPr>
+          <a:xfrm>
+            <a:off x="3208441" y="1409637"/>
+            <a:ext cx="6915150" cy="2257425"/>
+          </a:xfrm>
+          <a:prstGeom prst="rect">
+            <a:avLst/>
+          </a:prstGeom>
+        </p:spPr>
+      </p:pic>
+      <p:pic>
+        <p:nvPicPr>
+          <p:cNvPr id="6" name="Picture 5"/>
+          <p:cNvPicPr>
+            <a:picLocks noChangeAspect="1"/>
+          </p:cNvPicPr>
+          <p:nvPr/>
+        </p:nvPicPr>
+        <p:blipFill>
+          <a:blip r:embed="rId3"/>
+          <a:stretch>
+            <a:fillRect/>
+          </a:stretch>
+        </p:blipFill>
+        <p:spPr>
+          <a:xfrm>
+            <a:off x="7169541" y="3655497"/>
+            <a:ext cx="3648075" cy="2990850"/>
+          </a:xfrm>
+          <a:prstGeom prst="rect">
+            <a:avLst/>
+          </a:prstGeom>
+        </p:spPr>
+      </p:pic>
+      <p:pic>
+        <p:nvPicPr>
+          <p:cNvPr id="7" name="Picture 6"/>
+          <p:cNvPicPr>
+            <a:picLocks noChangeAspect="1"/>
+          </p:cNvPicPr>
+          <p:nvPr/>
+        </p:nvPicPr>
+        <p:blipFill>
+          <a:blip r:embed="rId4"/>
+          <a:stretch>
+            <a:fillRect/>
+          </a:stretch>
+        </p:blipFill>
+        <p:spPr>
+          <a:xfrm>
+            <a:off x="1918236" y="5168611"/>
+            <a:ext cx="3676650" cy="1009650"/>
+          </a:xfrm>
+          <a:prstGeom prst="rect">
+            <a:avLst/>
+          </a:prstGeom>
+        </p:spPr>
+      </p:pic>
+    </p:spTree>
+    <p:extLst>
+      <p:ext uri="{BB962C8B-B14F-4D97-AF65-F5344CB8AC3E}">
+        <p14:creationId xmlns:p14="http://schemas.microsoft.com/office/powerpoint/2010/main" val="256208762"/>
+      </p:ext>
+    </p:extLst>
+  </p:cSld>
+  <p:clrMapOvr>
+    <a:masterClrMapping/>
+  </p:clrMapOvr>
+</p:sld>
+</file>
+
+<file path=ppt/slides/slide74.xml><?xml version="1.0" encoding="utf-8"?>
+<p:sld xmlns:a="http://schemas.openxmlformats.org/drawingml/2006/main" xmlns:r="http://schemas.openxmlformats.org/officeDocument/2006/relationships" xmlns:p="http://schemas.openxmlformats.org/presentationml/2006/main">
+  <p:cSld>
+    <p:spTree>
+      <p:nvGrpSpPr>
+        <p:cNvPr id="1" name=""/>
+        <p:cNvGrpSpPr/>
+        <p:nvPr/>
+      </p:nvGrpSpPr>
+      <p:grpSpPr>
+        <a:xfrm>
+          <a:off x="0" y="0"/>
+          <a:ext cx="0" cy="0"/>
+          <a:chOff x="0" y="0"/>
+          <a:chExt cx="0" cy="0"/>
+        </a:xfrm>
+      </p:grpSpPr>
+      <p:sp>
+        <p:nvSpPr>
+          <p:cNvPr id="2" name="Title 1"/>
+          <p:cNvSpPr>
+            <a:spLocks noGrp="1"/>
+          </p:cNvSpPr>
+          <p:nvPr>
+            <p:ph type="title"/>
+          </p:nvPr>
+        </p:nvSpPr>
+        <p:spPr>
+          <a:xfrm>
+            <a:off x="838200" y="365125"/>
+            <a:ext cx="11353800" cy="1325563"/>
+          </a:xfrm>
+        </p:spPr>
+        <p:txBody>
+          <a:bodyPr/>
+          <a:lstStyle/>
+          <a:p>
+            <a:r>
+              <a:rPr lang="en-CA" dirty="0"/>
+              <a:t>Step 2: Assigning binary codes to states</a:t>
+            </a:r>
+          </a:p>
+        </p:txBody>
+      </p:sp>
+      <p:sp>
+        <p:nvSpPr>
+          <p:cNvPr id="3" name="Content Placeholder 2"/>
+          <p:cNvSpPr>
+            <a:spLocks noGrp="1"/>
+          </p:cNvSpPr>
+          <p:nvPr>
+            <p:ph idx="1"/>
+          </p:nvPr>
+        </p:nvSpPr>
+        <p:spPr>
+          <a:xfrm>
+            <a:off x="838200" y="1591294"/>
+            <a:ext cx="10515600" cy="2090057"/>
+          </a:xfrm>
+        </p:spPr>
+        <p:txBody>
+          <a:bodyPr>
+            <a:normAutofit fontScale="92500" lnSpcReduction="20000"/>
+          </a:bodyPr>
+          <a:lstStyle/>
+          <a:p>
+            <a:r>
+              <a:rPr lang="en-CA" dirty="0"/>
+              <a:t>We have four states ABCD, so we need at least two flip-flops Q</a:t>
+            </a:r>
+            <a:r>
+              <a:rPr lang="en-CA" sz="1700" dirty="0"/>
+              <a:t>1</a:t>
+            </a:r>
+            <a:r>
+              <a:rPr lang="en-CA" dirty="0"/>
+              <a:t>Q</a:t>
+            </a:r>
+            <a:r>
+              <a:rPr lang="en-CA" sz="1700" dirty="0"/>
+              <a:t>0</a:t>
+            </a:r>
+            <a:r>
+              <a:rPr lang="en-CA" dirty="0"/>
+              <a:t> </a:t>
+            </a:r>
+          </a:p>
+          <a:p>
+            <a:r>
+              <a:rPr lang="en-CA" dirty="0" smtClean="0"/>
+              <a:t>The </a:t>
+            </a:r>
+            <a:r>
+              <a:rPr lang="en-CA" dirty="0"/>
+              <a:t>easiest thing to do is represent state A with Q</a:t>
+            </a:r>
+            <a:r>
+              <a:rPr lang="en-CA" sz="1600" dirty="0"/>
+              <a:t>1</a:t>
+            </a:r>
+            <a:r>
+              <a:rPr lang="en-CA" dirty="0"/>
+              <a:t>Q</a:t>
+            </a:r>
+            <a:r>
+              <a:rPr lang="en-CA" sz="1600" dirty="0"/>
+              <a:t>0</a:t>
+            </a:r>
+            <a:r>
+              <a:rPr lang="en-CA" dirty="0"/>
+              <a:t> = 00, B with 01, C with 10, and D with 11 </a:t>
+            </a:r>
+          </a:p>
+          <a:p>
+            <a:r>
+              <a:rPr lang="en-CA" dirty="0" smtClean="0"/>
+              <a:t>The </a:t>
+            </a:r>
+            <a:r>
+              <a:rPr lang="en-CA" dirty="0"/>
+              <a:t>state assignment can have a big impact on circuit complexity, but we won’t worry about that too much in this class</a:t>
+            </a:r>
+          </a:p>
+        </p:txBody>
+      </p:sp>
+      <p:pic>
+        <p:nvPicPr>
+          <p:cNvPr id="4" name="Picture 3"/>
+          <p:cNvPicPr>
+            <a:picLocks noChangeAspect="1"/>
+          </p:cNvPicPr>
+          <p:nvPr/>
+        </p:nvPicPr>
+        <p:blipFill>
+          <a:blip r:embed="rId2"/>
+          <a:stretch>
+            <a:fillRect/>
+          </a:stretch>
+        </p:blipFill>
+        <p:spPr>
+          <a:xfrm>
+            <a:off x="2093152" y="3515096"/>
+            <a:ext cx="8005697" cy="3245798"/>
+          </a:xfrm>
+          <a:prstGeom prst="rect">
+            <a:avLst/>
+          </a:prstGeom>
+        </p:spPr>
+      </p:pic>
+    </p:spTree>
+    <p:extLst>
+      <p:ext uri="{BB962C8B-B14F-4D97-AF65-F5344CB8AC3E}">
+        <p14:creationId xmlns:p14="http://schemas.microsoft.com/office/powerpoint/2010/main" val="3329448094"/>
+      </p:ext>
+    </p:extLst>
+  </p:cSld>
+  <p:clrMapOvr>
+    <a:masterClrMapping/>
+  </p:clrMapOvr>
+</p:sld>
+</file>
+
+<file path=ppt/slides/slide75.xml><?xml version="1.0" encoding="utf-8"?>
+<p:sld xmlns:a="http://schemas.openxmlformats.org/drawingml/2006/main" xmlns:r="http://schemas.openxmlformats.org/officeDocument/2006/relationships" xmlns:p="http://schemas.openxmlformats.org/presentationml/2006/main">
+  <p:cSld>
+    <p:spTree>
+      <p:nvGrpSpPr>
+        <p:cNvPr id="1" name=""/>
+        <p:cNvGrpSpPr/>
+        <p:nvPr/>
+      </p:nvGrpSpPr>
+      <p:grpSpPr>
+        <a:xfrm>
+          <a:off x="0" y="0"/>
+          <a:ext cx="0" cy="0"/>
+          <a:chOff x="0" y="0"/>
+          <a:chExt cx="0" cy="0"/>
+        </a:xfrm>
+      </p:grpSpPr>
+      <p:sp>
+        <p:nvSpPr>
+          <p:cNvPr id="2" name="Title 1"/>
+          <p:cNvSpPr>
+            <a:spLocks noGrp="1"/>
+          </p:cNvSpPr>
+          <p:nvPr>
+            <p:ph type="title"/>
+          </p:nvPr>
+        </p:nvSpPr>
+        <p:spPr/>
+        <p:txBody>
+          <a:bodyPr/>
+          <a:lstStyle/>
+          <a:p>
+            <a:r>
+              <a:rPr lang="en-CA" dirty="0"/>
+              <a:t>Finding flip-flop input values</a:t>
+            </a:r>
+          </a:p>
+        </p:txBody>
+      </p:sp>
+      <p:pic>
+        <p:nvPicPr>
+          <p:cNvPr id="4" name="Picture 3"/>
+          <p:cNvPicPr>
+            <a:picLocks noChangeAspect="1"/>
+          </p:cNvPicPr>
+          <p:nvPr/>
+        </p:nvPicPr>
+        <p:blipFill>
+          <a:blip r:embed="rId2"/>
+          <a:stretch>
+            <a:fillRect/>
+          </a:stretch>
+        </p:blipFill>
+        <p:spPr>
+          <a:xfrm>
+            <a:off x="3181185" y="3728853"/>
+            <a:ext cx="5739495" cy="3015218"/>
+          </a:xfrm>
+          <a:prstGeom prst="rect">
+            <a:avLst/>
+          </a:prstGeom>
+        </p:spPr>
+      </p:pic>
+      <p:sp>
+        <p:nvSpPr>
+          <p:cNvPr id="3" name="Content Placeholder 2"/>
+          <p:cNvSpPr>
+            <a:spLocks noGrp="1"/>
+          </p:cNvSpPr>
+          <p:nvPr>
+            <p:ph idx="1"/>
+          </p:nvPr>
+        </p:nvSpPr>
+        <p:spPr>
+          <a:xfrm>
+            <a:off x="838200" y="1504998"/>
+            <a:ext cx="10515600" cy="2390115"/>
+          </a:xfrm>
+        </p:spPr>
+        <p:txBody>
+          <a:bodyPr>
+            <a:normAutofit fontScale="92500" lnSpcReduction="10000"/>
+          </a:bodyPr>
+          <a:lstStyle/>
+          <a:p>
+            <a:r>
+              <a:rPr lang="en-CA" dirty="0"/>
+              <a:t>Next we have to figure out how to actually make the flip-flops change from their present state into the desired next state </a:t>
+            </a:r>
+          </a:p>
+          <a:p>
+            <a:r>
+              <a:rPr lang="en-CA" dirty="0" smtClean="0"/>
+              <a:t>This </a:t>
+            </a:r>
+            <a:r>
+              <a:rPr lang="en-CA" dirty="0"/>
+              <a:t>depends on what kind of flip-flops you use! </a:t>
+            </a:r>
+          </a:p>
+          <a:p>
+            <a:r>
+              <a:rPr lang="en-CA" dirty="0" smtClean="0"/>
+              <a:t>We’ll </a:t>
+            </a:r>
+            <a:r>
+              <a:rPr lang="en-CA" dirty="0"/>
+              <a:t>use two JKs. For each flip-flip Q</a:t>
+            </a:r>
+            <a:r>
+              <a:rPr lang="en-CA" sz="1700" dirty="0"/>
+              <a:t>i</a:t>
+            </a:r>
+            <a:r>
+              <a:rPr lang="en-CA" dirty="0"/>
+              <a:t>, look at its present and next states, and determine what the inputs J</a:t>
+            </a:r>
+            <a:r>
+              <a:rPr lang="en-CA" sz="1700" dirty="0"/>
+              <a:t>i</a:t>
+            </a:r>
+            <a:r>
+              <a:rPr lang="en-CA" dirty="0"/>
+              <a:t> and K</a:t>
+            </a:r>
+            <a:r>
+              <a:rPr lang="en-CA" sz="1700" dirty="0"/>
+              <a:t>i</a:t>
+            </a:r>
+            <a:r>
+              <a:rPr lang="en-CA" dirty="0"/>
+              <a:t> should be in order to make that state change.</a:t>
+            </a:r>
+          </a:p>
+        </p:txBody>
+      </p:sp>
+    </p:spTree>
+    <p:extLst>
+      <p:ext uri="{BB962C8B-B14F-4D97-AF65-F5344CB8AC3E}">
+        <p14:creationId xmlns:p14="http://schemas.microsoft.com/office/powerpoint/2010/main" val="4065206825"/>
+      </p:ext>
+    </p:extLst>
+  </p:cSld>
+  <p:clrMapOvr>
+    <a:masterClrMapping/>
+  </p:clrMapOvr>
+</p:sld>
+</file>
+
+<file path=ppt/slides/slide76.xml><?xml version="1.0" encoding="utf-8"?>
+<p:sld xmlns:a="http://schemas.openxmlformats.org/drawingml/2006/main" xmlns:r="http://schemas.openxmlformats.org/officeDocument/2006/relationships" xmlns:p="http://schemas.openxmlformats.org/presentationml/2006/main">
+  <p:cSld>
+    <p:spTree>
+      <p:nvGrpSpPr>
+        <p:cNvPr id="1" name=""/>
+        <p:cNvGrpSpPr/>
+        <p:nvPr/>
+      </p:nvGrpSpPr>
+      <p:grpSpPr>
+        <a:xfrm>
+          <a:off x="0" y="0"/>
+          <a:ext cx="0" cy="0"/>
+          <a:chOff x="0" y="0"/>
+          <a:chExt cx="0" cy="0"/>
+        </a:xfrm>
+      </p:grpSpPr>
+      <p:sp>
+        <p:nvSpPr>
+          <p:cNvPr id="2" name="Title 1"/>
+          <p:cNvSpPr>
+            <a:spLocks noGrp="1"/>
+          </p:cNvSpPr>
+          <p:nvPr>
+            <p:ph type="title"/>
+          </p:nvPr>
+        </p:nvSpPr>
+        <p:spPr/>
+        <p:txBody>
+          <a:bodyPr/>
+          <a:lstStyle/>
+          <a:p>
+            <a:r>
+              <a:rPr lang="en-CA" dirty="0"/>
+              <a:t>Finding JK flip-flop input values</a:t>
+            </a:r>
+          </a:p>
+        </p:txBody>
+      </p:sp>
+      <p:sp>
+        <p:nvSpPr>
+          <p:cNvPr id="3" name="Content Placeholder 2"/>
+          <p:cNvSpPr>
+            <a:spLocks noGrp="1"/>
+          </p:cNvSpPr>
+          <p:nvPr>
+            <p:ph idx="1"/>
+          </p:nvPr>
+        </p:nvSpPr>
+        <p:spPr>
+          <a:xfrm>
+            <a:off x="838200" y="1591294"/>
+            <a:ext cx="10515600" cy="5070763"/>
+          </a:xfrm>
+        </p:spPr>
+        <p:txBody>
+          <a:bodyPr>
+            <a:normAutofit fontScale="92500" lnSpcReduction="20000"/>
+          </a:bodyPr>
+          <a:lstStyle/>
+          <a:p>
+            <a:r>
+              <a:rPr lang="en-CA" dirty="0"/>
+              <a:t>For JK flip-flops, this is a little tricky. Recall the characteristic table</a:t>
+            </a:r>
+            <a:r>
+              <a:rPr lang="en-CA" dirty="0" smtClean="0"/>
+              <a:t>:</a:t>
+            </a:r>
+          </a:p>
+          <a:p>
+            <a:endParaRPr lang="en-CA" dirty="0"/>
+          </a:p>
+          <a:p>
+            <a:endParaRPr lang="en-CA" dirty="0" smtClean="0"/>
+          </a:p>
+          <a:p>
+            <a:endParaRPr lang="en-CA" dirty="0" smtClean="0"/>
+          </a:p>
+          <a:p>
+            <a:endParaRPr lang="en-CA" dirty="0"/>
+          </a:p>
+          <a:p>
+            <a:r>
+              <a:rPr lang="en-CA" dirty="0"/>
+              <a:t>If the present state of a JK flip-flop is 0 and we want the next state to be 1, then we have two choices for the JK inputs: </a:t>
+            </a:r>
+            <a:endParaRPr lang="en-CA" dirty="0" smtClean="0"/>
+          </a:p>
+          <a:p>
+            <a:pPr marL="457200" lvl="1" indent="0">
+              <a:buNone/>
+            </a:pPr>
+            <a:r>
+              <a:rPr lang="en-CA" dirty="0" smtClean="0"/>
+              <a:t>– </a:t>
+            </a:r>
+            <a:r>
+              <a:rPr lang="en-CA" dirty="0"/>
+              <a:t>We can use JK= 10, to explicitly set the flip-flop’s next state to 1 </a:t>
+            </a:r>
+            <a:endParaRPr lang="en-CA" dirty="0" smtClean="0"/>
+          </a:p>
+          <a:p>
+            <a:pPr marL="457200" lvl="1" indent="0">
+              <a:buNone/>
+            </a:pPr>
+            <a:r>
+              <a:rPr lang="en-CA" dirty="0" smtClean="0"/>
+              <a:t>– </a:t>
+            </a:r>
+            <a:r>
+              <a:rPr lang="en-CA" dirty="0"/>
+              <a:t>We can also use JK=11, to complement the current state </a:t>
+            </a:r>
+            <a:r>
+              <a:rPr lang="en-CA" dirty="0" smtClean="0"/>
+              <a:t>0</a:t>
+            </a:r>
+          </a:p>
+          <a:p>
+            <a:r>
+              <a:rPr lang="en-CA" dirty="0" smtClean="0"/>
+              <a:t>So </a:t>
+            </a:r>
+            <a:r>
+              <a:rPr lang="en-CA" dirty="0"/>
+              <a:t>to change from 0 to 1, we must set J=1, but K could be either 0 or 1 </a:t>
+            </a:r>
+          </a:p>
+          <a:p>
+            <a:r>
+              <a:rPr lang="en-CA" dirty="0" smtClean="0"/>
+              <a:t>Similarly</a:t>
+            </a:r>
+            <a:r>
+              <a:rPr lang="en-CA" dirty="0"/>
+              <a:t>, the other possible state transitions can all be done in two different ways as well </a:t>
+            </a:r>
+          </a:p>
+        </p:txBody>
+      </p:sp>
+      <p:pic>
+        <p:nvPicPr>
+          <p:cNvPr id="4" name="Picture 3"/>
+          <p:cNvPicPr>
+            <a:picLocks noChangeAspect="1"/>
+          </p:cNvPicPr>
+          <p:nvPr/>
+        </p:nvPicPr>
+        <p:blipFill>
+          <a:blip r:embed="rId2"/>
+          <a:stretch>
+            <a:fillRect/>
+          </a:stretch>
+        </p:blipFill>
+        <p:spPr>
+          <a:xfrm>
+            <a:off x="4453123" y="2106448"/>
+            <a:ext cx="3143250" cy="1552575"/>
+          </a:xfrm>
+          <a:prstGeom prst="rect">
+            <a:avLst/>
+          </a:prstGeom>
+        </p:spPr>
+      </p:pic>
+    </p:spTree>
+    <p:extLst>
+      <p:ext uri="{BB962C8B-B14F-4D97-AF65-F5344CB8AC3E}">
+        <p14:creationId xmlns:p14="http://schemas.microsoft.com/office/powerpoint/2010/main" val="612955181"/>
+      </p:ext>
+    </p:extLst>
+  </p:cSld>
+  <p:clrMapOvr>
+    <a:masterClrMapping/>
+  </p:clrMapOvr>
+</p:sld>
+</file>
+
+<file path=ppt/slides/slide77.xml><?xml version="1.0" encoding="utf-8"?>
+<p:sld xmlns:a="http://schemas.openxmlformats.org/drawingml/2006/main" xmlns:r="http://schemas.openxmlformats.org/officeDocument/2006/relationships" xmlns:p="http://schemas.openxmlformats.org/presentationml/2006/main">
+  <p:cSld>
+    <p:spTree>
+      <p:nvGrpSpPr>
+        <p:cNvPr id="1" name=""/>
+        <p:cNvGrpSpPr/>
+        <p:nvPr/>
+      </p:nvGrpSpPr>
+      <p:grpSpPr>
+        <a:xfrm>
+          <a:off x="0" y="0"/>
+          <a:ext cx="0" cy="0"/>
+          <a:chOff x="0" y="0"/>
+          <a:chExt cx="0" cy="0"/>
+        </a:xfrm>
+      </p:grpSpPr>
+      <p:sp>
+        <p:nvSpPr>
+          <p:cNvPr id="2" name="Title 1"/>
+          <p:cNvSpPr>
+            <a:spLocks noGrp="1"/>
+          </p:cNvSpPr>
+          <p:nvPr>
+            <p:ph type="title"/>
+          </p:nvPr>
+        </p:nvSpPr>
+        <p:spPr/>
+        <p:txBody>
+          <a:bodyPr/>
+          <a:lstStyle/>
+          <a:p>
+            <a:endParaRPr lang="en-CA"/>
+          </a:p>
+        </p:txBody>
+      </p:sp>
+      <p:pic>
+        <p:nvPicPr>
+          <p:cNvPr id="4" name="Picture 3"/>
+          <p:cNvPicPr>
+            <a:picLocks noChangeAspect="1"/>
+          </p:cNvPicPr>
+          <p:nvPr/>
+        </p:nvPicPr>
+        <p:blipFill>
+          <a:blip r:embed="rId2"/>
+          <a:stretch>
+            <a:fillRect/>
+          </a:stretch>
+        </p:blipFill>
+        <p:spPr>
+          <a:xfrm>
+            <a:off x="537173" y="670893"/>
+            <a:ext cx="5447992" cy="5991225"/>
+          </a:xfrm>
+          <a:prstGeom prst="rect">
+            <a:avLst/>
+          </a:prstGeom>
+        </p:spPr>
+      </p:pic>
+      <p:pic>
+        <p:nvPicPr>
+          <p:cNvPr id="5" name="Picture 4"/>
+          <p:cNvPicPr>
+            <a:picLocks noChangeAspect="1"/>
+          </p:cNvPicPr>
+          <p:nvPr/>
+        </p:nvPicPr>
+        <p:blipFill>
+          <a:blip r:embed="rId3"/>
+          <a:stretch>
+            <a:fillRect/>
+          </a:stretch>
+        </p:blipFill>
+        <p:spPr>
+          <a:xfrm>
+            <a:off x="6093835" y="2410257"/>
+            <a:ext cx="5324475" cy="3533775"/>
+          </a:xfrm>
+          <a:prstGeom prst="rect">
+            <a:avLst/>
+          </a:prstGeom>
+        </p:spPr>
+      </p:pic>
+    </p:spTree>
+    <p:extLst>
+      <p:ext uri="{BB962C8B-B14F-4D97-AF65-F5344CB8AC3E}">
+        <p14:creationId xmlns:p14="http://schemas.microsoft.com/office/powerpoint/2010/main" val="3176053412"/>
+      </p:ext>
+    </p:extLst>
+  </p:cSld>
+  <p:clrMapOvr>
+    <a:masterClrMapping/>
+  </p:clrMapOvr>
+  <p:timing>
+    <p:tnLst>
+      <p:par>
+        <p:cTn id="1" dur="indefinite" restart="never" nodeType="tmRoot"/>
+      </p:par>
+    </p:tnLst>
+  </p:timing>
+</p:sld>
+</file>
+
+<file path=ppt/slides/slide78.xml><?xml version="1.0" encoding="utf-8"?>
+<p:sld xmlns:a="http://schemas.openxmlformats.org/drawingml/2006/main" xmlns:r="http://schemas.openxmlformats.org/officeDocument/2006/relationships" xmlns:p="http://schemas.openxmlformats.org/presentationml/2006/main">
+  <p:cSld>
+    <p:spTree>
+      <p:nvGrpSpPr>
+        <p:cNvPr id="1" name=""/>
+        <p:cNvGrpSpPr/>
+        <p:nvPr/>
+      </p:nvGrpSpPr>
+      <p:grpSpPr>
+        <a:xfrm>
+          <a:off x="0" y="0"/>
+          <a:ext cx="0" cy="0"/>
+          <a:chOff x="0" y="0"/>
+          <a:chExt cx="0" cy="0"/>
+        </a:xfrm>
+      </p:grpSpPr>
+      <p:sp>
+        <p:nvSpPr>
+          <p:cNvPr id="2" name="Title 1"/>
+          <p:cNvSpPr>
+            <a:spLocks noGrp="1"/>
+          </p:cNvSpPr>
+          <p:nvPr>
+            <p:ph type="title"/>
+          </p:nvPr>
+        </p:nvSpPr>
+        <p:spPr/>
+        <p:txBody>
+          <a:bodyPr/>
+          <a:lstStyle/>
+          <a:p>
+            <a:r>
+              <a:rPr lang="en-CA" dirty="0"/>
+              <a:t>JK excitation table</a:t>
+            </a:r>
+          </a:p>
+        </p:txBody>
+      </p:sp>
+      <p:sp>
+        <p:nvSpPr>
+          <p:cNvPr id="3" name="Content Placeholder 2"/>
+          <p:cNvSpPr>
+            <a:spLocks noGrp="1"/>
+          </p:cNvSpPr>
+          <p:nvPr>
+            <p:ph idx="1"/>
+          </p:nvPr>
+        </p:nvSpPr>
+        <p:spPr/>
+        <p:txBody>
+          <a:bodyPr/>
+          <a:lstStyle/>
+          <a:p>
+            <a:r>
+              <a:rPr lang="en-CA" dirty="0"/>
+              <a:t>An </a:t>
+            </a:r>
+            <a:r>
+              <a:rPr lang="en-CA" dirty="0">
+                <a:solidFill>
+                  <a:srgbClr val="FF0000"/>
+                </a:solidFill>
+              </a:rPr>
+              <a:t>excitation table </a:t>
+            </a:r>
+            <a:r>
+              <a:rPr lang="en-CA" dirty="0"/>
+              <a:t>shows what flip-flop inputs are required in order to make a desired state </a:t>
+            </a:r>
+            <a:r>
+              <a:rPr lang="en-CA" dirty="0" smtClean="0"/>
+              <a:t>change</a:t>
+            </a:r>
+          </a:p>
+          <a:p>
+            <a:endParaRPr lang="en-CA" dirty="0"/>
+          </a:p>
+          <a:p>
+            <a:endParaRPr lang="en-CA" dirty="0" smtClean="0"/>
+          </a:p>
+          <a:p>
+            <a:endParaRPr lang="en-CA" dirty="0" smtClean="0"/>
+          </a:p>
+          <a:p>
+            <a:r>
+              <a:rPr lang="en-CA" dirty="0"/>
+              <a:t>This is the same information that’s given in the characteristic table, but presented “backwards” </a:t>
+            </a:r>
+          </a:p>
+        </p:txBody>
+      </p:sp>
+      <p:pic>
+        <p:nvPicPr>
+          <p:cNvPr id="4" name="Picture 3"/>
+          <p:cNvPicPr>
+            <a:picLocks noChangeAspect="1"/>
+          </p:cNvPicPr>
+          <p:nvPr/>
+        </p:nvPicPr>
+        <p:blipFill>
+          <a:blip r:embed="rId2"/>
+          <a:stretch>
+            <a:fillRect/>
+          </a:stretch>
+        </p:blipFill>
+        <p:spPr>
+          <a:xfrm>
+            <a:off x="3627107" y="2685988"/>
+            <a:ext cx="4581525" cy="1533525"/>
+          </a:xfrm>
+          <a:prstGeom prst="rect">
+            <a:avLst/>
+          </a:prstGeom>
+        </p:spPr>
+      </p:pic>
+      <p:pic>
+        <p:nvPicPr>
+          <p:cNvPr id="5" name="Picture 4"/>
+          <p:cNvPicPr>
+            <a:picLocks noChangeAspect="1"/>
+          </p:cNvPicPr>
+          <p:nvPr/>
+        </p:nvPicPr>
+        <p:blipFill>
+          <a:blip r:embed="rId3"/>
+          <a:stretch>
+            <a:fillRect/>
+          </a:stretch>
+        </p:blipFill>
+        <p:spPr>
+          <a:xfrm>
+            <a:off x="4179990" y="5146530"/>
+            <a:ext cx="3143250" cy="1552575"/>
+          </a:xfrm>
+          <a:prstGeom prst="rect">
+            <a:avLst/>
+          </a:prstGeom>
+        </p:spPr>
+      </p:pic>
+    </p:spTree>
+    <p:extLst>
+      <p:ext uri="{BB962C8B-B14F-4D97-AF65-F5344CB8AC3E}">
+        <p14:creationId xmlns:p14="http://schemas.microsoft.com/office/powerpoint/2010/main" val="2813897855"/>
+      </p:ext>
+    </p:extLst>
+  </p:cSld>
+  <p:clrMapOvr>
+    <a:masterClrMapping/>
+  </p:clrMapOvr>
+  <p:timing>
+    <p:tnLst>
+      <p:par>
+        <p:cTn id="1" dur="indefinite" restart="never" nodeType="tmRoot"/>
+      </p:par>
+    </p:tnLst>
+  </p:timing>
+</p:sld>
+</file>
+
+<file path=ppt/slides/slide79.xml><?xml version="1.0" encoding="utf-8"?>
+<p:sld xmlns:a="http://schemas.openxmlformats.org/drawingml/2006/main" xmlns:r="http://schemas.openxmlformats.org/officeDocument/2006/relationships" xmlns:p="http://schemas.openxmlformats.org/presentationml/2006/main">
+  <p:cSld>
+    <p:spTree>
+      <p:nvGrpSpPr>
+        <p:cNvPr id="1" name=""/>
+        <p:cNvGrpSpPr/>
+        <p:nvPr/>
+      </p:nvGrpSpPr>
+      <p:grpSpPr>
+        <a:xfrm>
+          <a:off x="0" y="0"/>
+          <a:ext cx="0" cy="0"/>
+          <a:chOff x="0" y="0"/>
+          <a:chExt cx="0" cy="0"/>
+        </a:xfrm>
+      </p:grpSpPr>
+      <p:sp>
+        <p:nvSpPr>
+          <p:cNvPr id="2" name="Title 1"/>
+          <p:cNvSpPr>
+            <a:spLocks noGrp="1"/>
+          </p:cNvSpPr>
+          <p:nvPr>
+            <p:ph type="title"/>
+          </p:nvPr>
+        </p:nvSpPr>
+        <p:spPr/>
+        <p:txBody>
+          <a:bodyPr/>
+          <a:lstStyle/>
+          <a:p>
+            <a:r>
+              <a:rPr lang="en-CA" dirty="0"/>
+              <a:t>Back to the example </a:t>
+            </a:r>
+          </a:p>
+        </p:txBody>
+      </p:sp>
+      <p:sp>
+        <p:nvSpPr>
+          <p:cNvPr id="3" name="Content Placeholder 2"/>
+          <p:cNvSpPr>
+            <a:spLocks noGrp="1"/>
+          </p:cNvSpPr>
+          <p:nvPr>
+            <p:ph idx="1"/>
+          </p:nvPr>
+        </p:nvSpPr>
+        <p:spPr>
+          <a:xfrm>
+            <a:off x="838199" y="1825625"/>
+            <a:ext cx="7260771" cy="2152609"/>
+          </a:xfrm>
+        </p:spPr>
+        <p:txBody>
+          <a:bodyPr/>
+          <a:lstStyle/>
+          <a:p>
+            <a:r>
+              <a:rPr lang="en-CA" dirty="0"/>
+              <a:t>Use the JK excitation table on the right to find the correct values for each flip-flop’s inputs, based on its present and next states</a:t>
+            </a:r>
+          </a:p>
+        </p:txBody>
+      </p:sp>
+      <p:pic>
+        <p:nvPicPr>
+          <p:cNvPr id="4" name="Picture 3"/>
+          <p:cNvPicPr>
+            <a:picLocks noChangeAspect="1"/>
+          </p:cNvPicPr>
+          <p:nvPr/>
+        </p:nvPicPr>
+        <p:blipFill>
+          <a:blip r:embed="rId2"/>
+          <a:stretch>
+            <a:fillRect/>
+          </a:stretch>
+        </p:blipFill>
+        <p:spPr>
+          <a:xfrm>
+            <a:off x="8828685" y="1757238"/>
+            <a:ext cx="2609850" cy="1609725"/>
+          </a:xfrm>
+          <a:prstGeom prst="rect">
+            <a:avLst/>
+          </a:prstGeom>
+        </p:spPr>
+      </p:pic>
+      <p:pic>
+        <p:nvPicPr>
+          <p:cNvPr id="5" name="Picture 4"/>
+          <p:cNvPicPr>
+            <a:picLocks noChangeAspect="1"/>
+          </p:cNvPicPr>
+          <p:nvPr/>
+        </p:nvPicPr>
+        <p:blipFill>
+          <a:blip r:embed="rId3"/>
+          <a:stretch>
+            <a:fillRect/>
+          </a:stretch>
+        </p:blipFill>
+        <p:spPr>
+          <a:xfrm>
+            <a:off x="3166630" y="3379581"/>
+            <a:ext cx="6191250" cy="3305175"/>
+          </a:xfrm>
+          <a:prstGeom prst="rect">
+            <a:avLst/>
+          </a:prstGeom>
+        </p:spPr>
+      </p:pic>
+    </p:spTree>
+    <p:extLst>
+      <p:ext uri="{BB962C8B-B14F-4D97-AF65-F5344CB8AC3E}">
+        <p14:creationId xmlns:p14="http://schemas.microsoft.com/office/powerpoint/2010/main" val="1975184812"/>
+      </p:ext>
+    </p:extLst>
+  </p:cSld>
+  <p:clrMapOvr>
+    <a:masterClrMapping/>
+  </p:clrMapOvr>
+  <p:timing>
+    <p:tnLst>
+      <p:par>
+        <p:cTn id="1" dur="indefinite" restart="never" nodeType="tmRoot"/>
+      </p:par>
+    </p:tnLst>
+  </p:timing>
+</p:sld>
+</file>
+
 <file path=ppt/slides/slide8.xml><?xml version="1.0" encoding="utf-8"?>
 <p:sld xmlns:a="http://schemas.openxmlformats.org/drawingml/2006/main" xmlns:r="http://schemas.openxmlformats.org/officeDocument/2006/relationships" xmlns:p="http://schemas.openxmlformats.org/presentationml/2006/main">
   <p:cSld>
@@ -15201,6 +17388,1136 @@
   <p:clrMapOvr>
     <a:masterClrMapping/>
   </p:clrMapOvr>
+</p:sld>
+</file>
+
+<file path=ppt/slides/slide80.xml><?xml version="1.0" encoding="utf-8"?>
+<p:sld xmlns:a="http://schemas.openxmlformats.org/drawingml/2006/main" xmlns:r="http://schemas.openxmlformats.org/officeDocument/2006/relationships" xmlns:p="http://schemas.openxmlformats.org/presentationml/2006/main">
+  <p:cSld>
+    <p:spTree>
+      <p:nvGrpSpPr>
+        <p:cNvPr id="1" name=""/>
+        <p:cNvGrpSpPr/>
+        <p:nvPr/>
+      </p:nvGrpSpPr>
+      <p:grpSpPr>
+        <a:xfrm>
+          <a:off x="0" y="0"/>
+          <a:ext cx="0" cy="0"/>
+          <a:chOff x="0" y="0"/>
+          <a:chExt cx="0" cy="0"/>
+        </a:xfrm>
+      </p:grpSpPr>
+      <p:sp>
+        <p:nvSpPr>
+          <p:cNvPr id="2" name="Title 1"/>
+          <p:cNvSpPr>
+            <a:spLocks noGrp="1"/>
+          </p:cNvSpPr>
+          <p:nvPr>
+            <p:ph type="title"/>
+          </p:nvPr>
+        </p:nvSpPr>
+        <p:spPr>
+          <a:xfrm>
+            <a:off x="838200" y="365125"/>
+            <a:ext cx="10977748" cy="1325563"/>
+          </a:xfrm>
+        </p:spPr>
+        <p:txBody>
+          <a:bodyPr/>
+          <a:lstStyle/>
+          <a:p>
+            <a:r>
+              <a:rPr lang="en-CA" dirty="0"/>
+              <a:t>Step 4: Find equations for the FF inputs and output</a:t>
+            </a:r>
+          </a:p>
+        </p:txBody>
+      </p:sp>
+      <p:pic>
+        <p:nvPicPr>
+          <p:cNvPr id="4" name="Picture 3"/>
+          <p:cNvPicPr>
+            <a:picLocks noChangeAspect="1"/>
+          </p:cNvPicPr>
+          <p:nvPr/>
+        </p:nvPicPr>
+        <p:blipFill>
+          <a:blip r:embed="rId2"/>
+          <a:stretch>
+            <a:fillRect/>
+          </a:stretch>
+        </p:blipFill>
+        <p:spPr>
+          <a:xfrm>
+            <a:off x="2245364" y="3410507"/>
+            <a:ext cx="7820025" cy="3267075"/>
+          </a:xfrm>
+          <a:prstGeom prst="rect">
+            <a:avLst/>
+          </a:prstGeom>
+        </p:spPr>
+      </p:pic>
+      <p:sp>
+        <p:nvSpPr>
+          <p:cNvPr id="3" name="Content Placeholder 2"/>
+          <p:cNvSpPr>
+            <a:spLocks noGrp="1"/>
+          </p:cNvSpPr>
+          <p:nvPr>
+            <p:ph idx="1"/>
+          </p:nvPr>
+        </p:nvSpPr>
+        <p:spPr>
+          <a:xfrm>
+            <a:off x="838200" y="1825626"/>
+            <a:ext cx="10906496" cy="1630094"/>
+          </a:xfrm>
+        </p:spPr>
+        <p:txBody>
+          <a:bodyPr>
+            <a:normAutofit fontScale="85000" lnSpcReduction="20000"/>
+          </a:bodyPr>
+          <a:lstStyle/>
+          <a:p>
+            <a:r>
+              <a:rPr lang="en-CA" dirty="0"/>
+              <a:t>Now you can make K-maps and find equations for each of the four </a:t>
+            </a:r>
+            <a:r>
+              <a:rPr lang="en-CA" dirty="0" smtClean="0"/>
+              <a:t>flip-flop </a:t>
+            </a:r>
+            <a:r>
+              <a:rPr lang="en-CA" dirty="0"/>
+              <a:t>inputs, as well as for the output Z </a:t>
+            </a:r>
+            <a:endParaRPr lang="en-CA" dirty="0" smtClean="0"/>
+          </a:p>
+          <a:p>
+            <a:r>
+              <a:rPr lang="en-CA" dirty="0" smtClean="0"/>
+              <a:t>These </a:t>
+            </a:r>
+            <a:r>
+              <a:rPr lang="en-CA" dirty="0"/>
+              <a:t>equations are in terms of the present state and the </a:t>
+            </a:r>
+            <a:r>
+              <a:rPr lang="en-CA" dirty="0" smtClean="0"/>
+              <a:t>inputs</a:t>
+            </a:r>
+          </a:p>
+          <a:p>
+            <a:r>
+              <a:rPr lang="en-CA" dirty="0" smtClean="0"/>
+              <a:t>The </a:t>
+            </a:r>
+            <a:r>
+              <a:rPr lang="en-CA" dirty="0"/>
+              <a:t>advantage of using JK flip-flops is that there are many don’t care conditions, which can result in simpler MSP equations</a:t>
+            </a:r>
+          </a:p>
+        </p:txBody>
+      </p:sp>
+      <p:sp>
+        <p:nvSpPr>
+          <p:cNvPr id="5" name="Rectangle 4"/>
+          <p:cNvSpPr/>
+          <p:nvPr/>
+        </p:nvSpPr>
+        <p:spPr>
+          <a:xfrm>
+            <a:off x="10628416" y="4334493"/>
+            <a:ext cx="1425039" cy="688769"/>
+          </a:xfrm>
+          <a:prstGeom prst="rect">
+            <a:avLst/>
+          </a:prstGeom>
+        </p:spPr>
+        <p:style>
+          <a:lnRef idx="2">
+            <a:schemeClr val="accent1">
+              <a:shade val="50000"/>
+            </a:schemeClr>
+          </a:lnRef>
+          <a:fillRef idx="1">
+            <a:schemeClr val="accent1"/>
+          </a:fillRef>
+          <a:effectRef idx="0">
+            <a:schemeClr val="accent1"/>
+          </a:effectRef>
+          <a:fontRef idx="minor">
+            <a:schemeClr val="lt1"/>
+          </a:fontRef>
+        </p:style>
+        <p:txBody>
+          <a:bodyPr rtlCol="0" anchor="ctr"/>
+          <a:lstStyle/>
+          <a:p>
+            <a:pPr algn="ctr"/>
+            <a:r>
+              <a:rPr lang="en-CA" dirty="0" smtClean="0"/>
+              <a:t>Use K-map</a:t>
+            </a:r>
+            <a:endParaRPr lang="en-CA" dirty="0"/>
+          </a:p>
+        </p:txBody>
+      </p:sp>
+      <p:cxnSp>
+        <p:nvCxnSpPr>
+          <p:cNvPr id="7" name="Straight Arrow Connector 6"/>
+          <p:cNvCxnSpPr>
+            <a:stCxn id="5" idx="1"/>
+          </p:cNvCxnSpPr>
+          <p:nvPr/>
+        </p:nvCxnSpPr>
+        <p:spPr>
+          <a:xfrm flipH="1" flipV="1">
+            <a:off x="9987148" y="4191990"/>
+            <a:ext cx="641268" cy="486888"/>
+          </a:xfrm>
+          <a:prstGeom prst="straightConnector1">
+            <a:avLst/>
+          </a:prstGeom>
+          <a:ln>
+            <a:tailEnd type="triangle"/>
+          </a:ln>
+        </p:spPr>
+        <p:style>
+          <a:lnRef idx="1">
+            <a:schemeClr val="accent1"/>
+          </a:lnRef>
+          <a:fillRef idx="0">
+            <a:schemeClr val="accent1"/>
+          </a:fillRef>
+          <a:effectRef idx="0">
+            <a:schemeClr val="accent1"/>
+          </a:effectRef>
+          <a:fontRef idx="minor">
+            <a:schemeClr val="tx1"/>
+          </a:fontRef>
+        </p:style>
+      </p:cxnSp>
+      <p:cxnSp>
+        <p:nvCxnSpPr>
+          <p:cNvPr id="8" name="Straight Arrow Connector 7"/>
+          <p:cNvCxnSpPr>
+            <a:stCxn id="5" idx="1"/>
+          </p:cNvCxnSpPr>
+          <p:nvPr/>
+        </p:nvCxnSpPr>
+        <p:spPr>
+          <a:xfrm flipH="1" flipV="1">
+            <a:off x="10046525" y="4572000"/>
+            <a:ext cx="581891" cy="106878"/>
+          </a:xfrm>
+          <a:prstGeom prst="straightConnector1">
+            <a:avLst/>
+          </a:prstGeom>
+          <a:ln>
+            <a:tailEnd type="triangle"/>
+          </a:ln>
+        </p:spPr>
+        <p:style>
+          <a:lnRef idx="1">
+            <a:schemeClr val="accent1"/>
+          </a:lnRef>
+          <a:fillRef idx="0">
+            <a:schemeClr val="accent1"/>
+          </a:fillRef>
+          <a:effectRef idx="0">
+            <a:schemeClr val="accent1"/>
+          </a:effectRef>
+          <a:fontRef idx="minor">
+            <a:schemeClr val="tx1"/>
+          </a:fontRef>
+        </p:style>
+      </p:cxnSp>
+      <p:cxnSp>
+        <p:nvCxnSpPr>
+          <p:cNvPr id="11" name="Straight Arrow Connector 10"/>
+          <p:cNvCxnSpPr>
+            <a:stCxn id="5" idx="1"/>
+            <a:endCxn id="4" idx="3"/>
+          </p:cNvCxnSpPr>
+          <p:nvPr/>
+        </p:nvCxnSpPr>
+        <p:spPr>
+          <a:xfrm flipH="1">
+            <a:off x="10065389" y="4678878"/>
+            <a:ext cx="563027" cy="365167"/>
+          </a:xfrm>
+          <a:prstGeom prst="straightConnector1">
+            <a:avLst/>
+          </a:prstGeom>
+          <a:ln>
+            <a:tailEnd type="triangle"/>
+          </a:ln>
+        </p:spPr>
+        <p:style>
+          <a:lnRef idx="1">
+            <a:schemeClr val="accent1"/>
+          </a:lnRef>
+          <a:fillRef idx="0">
+            <a:schemeClr val="accent1"/>
+          </a:fillRef>
+          <a:effectRef idx="0">
+            <a:schemeClr val="accent1"/>
+          </a:effectRef>
+          <a:fontRef idx="minor">
+            <a:schemeClr val="tx1"/>
+          </a:fontRef>
+        </p:style>
+      </p:cxnSp>
+      <p:cxnSp>
+        <p:nvCxnSpPr>
+          <p:cNvPr id="15" name="Straight Arrow Connector 14"/>
+          <p:cNvCxnSpPr>
+            <a:stCxn id="5" idx="1"/>
+          </p:cNvCxnSpPr>
+          <p:nvPr/>
+        </p:nvCxnSpPr>
+        <p:spPr>
+          <a:xfrm flipH="1">
+            <a:off x="9939647" y="4678878"/>
+            <a:ext cx="688769" cy="1246909"/>
+          </a:xfrm>
+          <a:prstGeom prst="straightConnector1">
+            <a:avLst/>
+          </a:prstGeom>
+          <a:ln>
+            <a:tailEnd type="triangle"/>
+          </a:ln>
+        </p:spPr>
+        <p:style>
+          <a:lnRef idx="1">
+            <a:schemeClr val="accent1"/>
+          </a:lnRef>
+          <a:fillRef idx="0">
+            <a:schemeClr val="accent1"/>
+          </a:fillRef>
+          <a:effectRef idx="0">
+            <a:schemeClr val="accent1"/>
+          </a:effectRef>
+          <a:fontRef idx="minor">
+            <a:schemeClr val="tx1"/>
+          </a:fontRef>
+        </p:style>
+      </p:cxnSp>
+      <p:sp>
+        <p:nvSpPr>
+          <p:cNvPr id="6" name="Rectangle 5"/>
+          <p:cNvSpPr/>
+          <p:nvPr/>
+        </p:nvSpPr>
+        <p:spPr>
+          <a:xfrm>
+            <a:off x="8660675" y="3455720"/>
+            <a:ext cx="3431969" cy="3221862"/>
+          </a:xfrm>
+          <a:prstGeom prst="rect">
+            <a:avLst/>
+          </a:prstGeom>
+          <a:solidFill>
+            <a:schemeClr val="bg1"/>
+          </a:solidFill>
+          <a:ln>
+            <a:noFill/>
+          </a:ln>
+        </p:spPr>
+        <p:style>
+          <a:lnRef idx="2">
+            <a:schemeClr val="accent1">
+              <a:shade val="50000"/>
+            </a:schemeClr>
+          </a:lnRef>
+          <a:fillRef idx="1">
+            <a:schemeClr val="accent1"/>
+          </a:fillRef>
+          <a:effectRef idx="0">
+            <a:schemeClr val="accent1"/>
+          </a:effectRef>
+          <a:fontRef idx="minor">
+            <a:schemeClr val="lt1"/>
+          </a:fontRef>
+        </p:style>
+        <p:txBody>
+          <a:bodyPr rtlCol="0" anchor="ctr"/>
+          <a:lstStyle/>
+          <a:p>
+            <a:pPr algn="ctr"/>
+            <a:endParaRPr lang="en-US"/>
+          </a:p>
+        </p:txBody>
+      </p:sp>
+    </p:spTree>
+    <p:extLst>
+      <p:ext uri="{BB962C8B-B14F-4D97-AF65-F5344CB8AC3E}">
+        <p14:creationId xmlns:p14="http://schemas.microsoft.com/office/powerpoint/2010/main" val="789508664"/>
+      </p:ext>
+    </p:extLst>
+  </p:cSld>
+  <p:clrMapOvr>
+    <a:masterClrMapping/>
+  </p:clrMapOvr>
+  <p:timing>
+    <p:tnLst>
+      <p:par>
+        <p:cTn id="1" dur="indefinite" restart="never" nodeType="tmRoot">
+          <p:childTnLst>
+            <p:seq concurrent="1" nextAc="seek">
+              <p:cTn id="2" dur="indefinite" nodeType="mainSeq">
+                <p:childTnLst>
+                  <p:par>
+                    <p:cTn id="3" fill="hold">
+                      <p:stCondLst>
+                        <p:cond delay="indefinite"/>
+                      </p:stCondLst>
+                      <p:childTnLst>
+                        <p:par>
+                          <p:cTn id="4" fill="hold">
+                            <p:stCondLst>
+                              <p:cond delay="0"/>
+                            </p:stCondLst>
+                            <p:childTnLst>
+                              <p:par>
+                                <p:cTn id="5" presetID="16" presetClass="entr" presetSubtype="21" fill="hold" grpId="0" nodeType="clickEffect">
+                                  <p:stCondLst>
+                                    <p:cond delay="0"/>
+                                  </p:stCondLst>
+                                  <p:childTnLst>
+                                    <p:set>
+                                      <p:cBhvr>
+                                        <p:cTn id="6" dur="1" fill="hold">
+                                          <p:stCondLst>
+                                            <p:cond delay="0"/>
+                                          </p:stCondLst>
+                                        </p:cTn>
+                                        <p:tgtEl>
+                                          <p:spTgt spid="5"/>
+                                        </p:tgtEl>
+                                        <p:attrNameLst>
+                                          <p:attrName>style.visibility</p:attrName>
+                                        </p:attrNameLst>
+                                      </p:cBhvr>
+                                      <p:to>
+                                        <p:strVal val="visible"/>
+                                      </p:to>
+                                    </p:set>
+                                    <p:animEffect transition="in" filter="barn(inVertical)">
+                                      <p:cBhvr>
+                                        <p:cTn id="7" dur="500"/>
+                                        <p:tgtEl>
+                                          <p:spTgt spid="5"/>
+                                        </p:tgtEl>
+                                      </p:cBhvr>
+                                    </p:animEffect>
+                                  </p:childTnLst>
+                                </p:cTn>
+                              </p:par>
+                              <p:par>
+                                <p:cTn id="8" presetID="16" presetClass="entr" presetSubtype="21" fill="hold" nodeType="withEffect">
+                                  <p:stCondLst>
+                                    <p:cond delay="0"/>
+                                  </p:stCondLst>
+                                  <p:childTnLst>
+                                    <p:set>
+                                      <p:cBhvr>
+                                        <p:cTn id="9" dur="1" fill="hold">
+                                          <p:stCondLst>
+                                            <p:cond delay="0"/>
+                                          </p:stCondLst>
+                                        </p:cTn>
+                                        <p:tgtEl>
+                                          <p:spTgt spid="7"/>
+                                        </p:tgtEl>
+                                        <p:attrNameLst>
+                                          <p:attrName>style.visibility</p:attrName>
+                                        </p:attrNameLst>
+                                      </p:cBhvr>
+                                      <p:to>
+                                        <p:strVal val="visible"/>
+                                      </p:to>
+                                    </p:set>
+                                    <p:animEffect transition="in" filter="barn(inVertical)">
+                                      <p:cBhvr>
+                                        <p:cTn id="10" dur="500"/>
+                                        <p:tgtEl>
+                                          <p:spTgt spid="7"/>
+                                        </p:tgtEl>
+                                      </p:cBhvr>
+                                    </p:animEffect>
+                                  </p:childTnLst>
+                                </p:cTn>
+                              </p:par>
+                              <p:par>
+                                <p:cTn id="11" presetID="16" presetClass="entr" presetSubtype="21" fill="hold" nodeType="withEffect">
+                                  <p:stCondLst>
+                                    <p:cond delay="0"/>
+                                  </p:stCondLst>
+                                  <p:childTnLst>
+                                    <p:set>
+                                      <p:cBhvr>
+                                        <p:cTn id="12" dur="1" fill="hold">
+                                          <p:stCondLst>
+                                            <p:cond delay="0"/>
+                                          </p:stCondLst>
+                                        </p:cTn>
+                                        <p:tgtEl>
+                                          <p:spTgt spid="8"/>
+                                        </p:tgtEl>
+                                        <p:attrNameLst>
+                                          <p:attrName>style.visibility</p:attrName>
+                                        </p:attrNameLst>
+                                      </p:cBhvr>
+                                      <p:to>
+                                        <p:strVal val="visible"/>
+                                      </p:to>
+                                    </p:set>
+                                    <p:animEffect transition="in" filter="barn(inVertical)">
+                                      <p:cBhvr>
+                                        <p:cTn id="13" dur="500"/>
+                                        <p:tgtEl>
+                                          <p:spTgt spid="8"/>
+                                        </p:tgtEl>
+                                      </p:cBhvr>
+                                    </p:animEffect>
+                                  </p:childTnLst>
+                                </p:cTn>
+                              </p:par>
+                              <p:par>
+                                <p:cTn id="14" presetID="16" presetClass="entr" presetSubtype="21" fill="hold" nodeType="withEffect">
+                                  <p:stCondLst>
+                                    <p:cond delay="0"/>
+                                  </p:stCondLst>
+                                  <p:childTnLst>
+                                    <p:set>
+                                      <p:cBhvr>
+                                        <p:cTn id="15" dur="1" fill="hold">
+                                          <p:stCondLst>
+                                            <p:cond delay="0"/>
+                                          </p:stCondLst>
+                                        </p:cTn>
+                                        <p:tgtEl>
+                                          <p:spTgt spid="11"/>
+                                        </p:tgtEl>
+                                        <p:attrNameLst>
+                                          <p:attrName>style.visibility</p:attrName>
+                                        </p:attrNameLst>
+                                      </p:cBhvr>
+                                      <p:to>
+                                        <p:strVal val="visible"/>
+                                      </p:to>
+                                    </p:set>
+                                    <p:animEffect transition="in" filter="barn(inVertical)">
+                                      <p:cBhvr>
+                                        <p:cTn id="16" dur="500"/>
+                                        <p:tgtEl>
+                                          <p:spTgt spid="11"/>
+                                        </p:tgtEl>
+                                      </p:cBhvr>
+                                    </p:animEffect>
+                                  </p:childTnLst>
+                                </p:cTn>
+                              </p:par>
+                              <p:par>
+                                <p:cTn id="17" presetID="16" presetClass="entr" presetSubtype="21" fill="hold" nodeType="withEffect">
+                                  <p:stCondLst>
+                                    <p:cond delay="0"/>
+                                  </p:stCondLst>
+                                  <p:childTnLst>
+                                    <p:set>
+                                      <p:cBhvr>
+                                        <p:cTn id="18" dur="1" fill="hold">
+                                          <p:stCondLst>
+                                            <p:cond delay="0"/>
+                                          </p:stCondLst>
+                                        </p:cTn>
+                                        <p:tgtEl>
+                                          <p:spTgt spid="15"/>
+                                        </p:tgtEl>
+                                        <p:attrNameLst>
+                                          <p:attrName>style.visibility</p:attrName>
+                                        </p:attrNameLst>
+                                      </p:cBhvr>
+                                      <p:to>
+                                        <p:strVal val="visible"/>
+                                      </p:to>
+                                    </p:set>
+                                    <p:animEffect transition="in" filter="barn(inVertical)">
+                                      <p:cBhvr>
+                                        <p:cTn id="19" dur="500"/>
+                                        <p:tgtEl>
+                                          <p:spTgt spid="15"/>
+                                        </p:tgtEl>
+                                      </p:cBhvr>
+                                    </p:animEffect>
+                                  </p:childTnLst>
+                                </p:cTn>
+                              </p:par>
+                            </p:childTnLst>
+                          </p:cTn>
+                        </p:par>
+                      </p:childTnLst>
+                    </p:cTn>
+                  </p:par>
+                  <p:par>
+                    <p:cTn id="20" fill="hold">
+                      <p:stCondLst>
+                        <p:cond delay="indefinite"/>
+                      </p:stCondLst>
+                      <p:childTnLst>
+                        <p:par>
+                          <p:cTn id="21" fill="hold">
+                            <p:stCondLst>
+                              <p:cond delay="0"/>
+                            </p:stCondLst>
+                            <p:childTnLst>
+                              <p:par>
+                                <p:cTn id="22" presetID="10" presetClass="exit" presetSubtype="0" fill="hold" grpId="0" nodeType="clickEffect">
+                                  <p:stCondLst>
+                                    <p:cond delay="0"/>
+                                  </p:stCondLst>
+                                  <p:childTnLst>
+                                    <p:animEffect transition="out" filter="fade">
+                                      <p:cBhvr>
+                                        <p:cTn id="23" dur="500"/>
+                                        <p:tgtEl>
+                                          <p:spTgt spid="6"/>
+                                        </p:tgtEl>
+                                      </p:cBhvr>
+                                    </p:animEffect>
+                                    <p:set>
+                                      <p:cBhvr>
+                                        <p:cTn id="24" dur="1" fill="hold">
+                                          <p:stCondLst>
+                                            <p:cond delay="499"/>
+                                          </p:stCondLst>
+                                        </p:cTn>
+                                        <p:tgtEl>
+                                          <p:spTgt spid="6"/>
+                                        </p:tgtEl>
+                                        <p:attrNameLst>
+                                          <p:attrName>style.visibility</p:attrName>
+                                        </p:attrNameLst>
+                                      </p:cBhvr>
+                                      <p:to>
+                                        <p:strVal val="hidden"/>
+                                      </p:to>
+                                    </p:set>
+                                  </p:childTnLst>
+                                </p:cTn>
+                              </p:par>
+                            </p:childTnLst>
+                          </p:cTn>
+                        </p:par>
+                      </p:childTnLst>
+                    </p:cTn>
+                  </p:par>
+                </p:childTnLst>
+              </p:cTn>
+              <p:prevCondLst>
+                <p:cond evt="onPrev" delay="0">
+                  <p:tgtEl>
+                    <p:sldTgt/>
+                  </p:tgtEl>
+                </p:cond>
+              </p:prevCondLst>
+              <p:nextCondLst>
+                <p:cond evt="onNext" delay="0">
+                  <p:tgtEl>
+                    <p:sldTgt/>
+                  </p:tgtEl>
+                </p:cond>
+              </p:nextCondLst>
+            </p:seq>
+          </p:childTnLst>
+        </p:cTn>
+      </p:par>
+    </p:tnLst>
+    <p:bldLst>
+      <p:bldP spid="5" grpId="0" animBg="1"/>
+      <p:bldP spid="6" grpId="0" animBg="1"/>
+    </p:bldLst>
+  </p:timing>
+</p:sld>
+</file>
+
+<file path=ppt/slides/slide81.xml><?xml version="1.0" encoding="utf-8"?>
+<p:sld xmlns:a="http://schemas.openxmlformats.org/drawingml/2006/main" xmlns:r="http://schemas.openxmlformats.org/officeDocument/2006/relationships" xmlns:p="http://schemas.openxmlformats.org/presentationml/2006/main">
+  <p:cSld>
+    <p:spTree>
+      <p:nvGrpSpPr>
+        <p:cNvPr id="1" name=""/>
+        <p:cNvGrpSpPr/>
+        <p:nvPr/>
+      </p:nvGrpSpPr>
+      <p:grpSpPr>
+        <a:xfrm>
+          <a:off x="0" y="0"/>
+          <a:ext cx="0" cy="0"/>
+          <a:chOff x="0" y="0"/>
+          <a:chExt cx="0" cy="0"/>
+        </a:xfrm>
+      </p:grpSpPr>
+      <p:sp>
+        <p:nvSpPr>
+          <p:cNvPr id="2" name="Title 1"/>
+          <p:cNvSpPr>
+            <a:spLocks noGrp="1"/>
+          </p:cNvSpPr>
+          <p:nvPr>
+            <p:ph type="title"/>
+          </p:nvPr>
+        </p:nvSpPr>
+        <p:spPr/>
+        <p:txBody>
+          <a:bodyPr/>
+          <a:lstStyle/>
+          <a:p>
+            <a:r>
+              <a:rPr lang="en-CA" dirty="0"/>
+              <a:t>Step 5: Build the circuit</a:t>
+            </a:r>
+          </a:p>
+        </p:txBody>
+      </p:sp>
+      <p:sp>
+        <p:nvSpPr>
+          <p:cNvPr id="3" name="Content Placeholder 2"/>
+          <p:cNvSpPr>
+            <a:spLocks noGrp="1"/>
+          </p:cNvSpPr>
+          <p:nvPr>
+            <p:ph idx="1"/>
+          </p:nvPr>
+        </p:nvSpPr>
+        <p:spPr/>
+        <p:txBody>
+          <a:bodyPr/>
+          <a:lstStyle/>
+          <a:p>
+            <a:r>
+              <a:rPr lang="en-CA" dirty="0"/>
+              <a:t>Lastly, we use these simplified equations to build the completed circuit</a:t>
+            </a:r>
+          </a:p>
+        </p:txBody>
+      </p:sp>
+      <p:pic>
+        <p:nvPicPr>
+          <p:cNvPr id="4" name="Picture 3"/>
+          <p:cNvPicPr>
+            <a:picLocks noChangeAspect="1"/>
+          </p:cNvPicPr>
+          <p:nvPr/>
+        </p:nvPicPr>
+        <p:blipFill>
+          <a:blip r:embed="rId2"/>
+          <a:stretch>
+            <a:fillRect/>
+          </a:stretch>
+        </p:blipFill>
+        <p:spPr>
+          <a:xfrm>
+            <a:off x="2603047" y="2769176"/>
+            <a:ext cx="6724650" cy="3314700"/>
+          </a:xfrm>
+          <a:prstGeom prst="rect">
+            <a:avLst/>
+          </a:prstGeom>
+        </p:spPr>
+      </p:pic>
+    </p:spTree>
+    <p:extLst>
+      <p:ext uri="{BB962C8B-B14F-4D97-AF65-F5344CB8AC3E}">
+        <p14:creationId xmlns:p14="http://schemas.microsoft.com/office/powerpoint/2010/main" val="1106779549"/>
+      </p:ext>
+    </p:extLst>
+  </p:cSld>
+  <p:clrMapOvr>
+    <a:masterClrMapping/>
+  </p:clrMapOvr>
+  <p:timing>
+    <p:tnLst>
+      <p:par>
+        <p:cTn id="1" dur="indefinite" restart="never" nodeType="tmRoot"/>
+      </p:par>
+    </p:tnLst>
+  </p:timing>
+</p:sld>
+</file>
+
+<file path=ppt/slides/slide82.xml><?xml version="1.0" encoding="utf-8"?>
+<p:sld xmlns:a="http://schemas.openxmlformats.org/drawingml/2006/main" xmlns:r="http://schemas.openxmlformats.org/officeDocument/2006/relationships" xmlns:p="http://schemas.openxmlformats.org/presentationml/2006/main">
+  <p:cSld>
+    <p:spTree>
+      <p:nvGrpSpPr>
+        <p:cNvPr id="1" name=""/>
+        <p:cNvGrpSpPr/>
+        <p:nvPr/>
+      </p:nvGrpSpPr>
+      <p:grpSpPr>
+        <a:xfrm>
+          <a:off x="0" y="0"/>
+          <a:ext cx="0" cy="0"/>
+          <a:chOff x="0" y="0"/>
+          <a:chExt cx="0" cy="0"/>
+        </a:xfrm>
+      </p:grpSpPr>
+      <p:sp>
+        <p:nvSpPr>
+          <p:cNvPr id="2" name="Title 1"/>
+          <p:cNvSpPr>
+            <a:spLocks noGrp="1"/>
+          </p:cNvSpPr>
+          <p:nvPr>
+            <p:ph type="title"/>
+          </p:nvPr>
+        </p:nvSpPr>
+        <p:spPr/>
+        <p:txBody>
+          <a:bodyPr/>
+          <a:lstStyle/>
+          <a:p>
+            <a:r>
+              <a:rPr lang="en-CA" dirty="0" smtClean="0"/>
+              <a:t>Timing diagram</a:t>
+            </a:r>
+            <a:endParaRPr lang="en-CA" dirty="0"/>
+          </a:p>
+        </p:txBody>
+      </p:sp>
+      <p:pic>
+        <p:nvPicPr>
+          <p:cNvPr id="4" name="Picture 3"/>
+          <p:cNvPicPr>
+            <a:picLocks noChangeAspect="1"/>
+          </p:cNvPicPr>
+          <p:nvPr/>
+        </p:nvPicPr>
+        <p:blipFill>
+          <a:blip r:embed="rId2"/>
+          <a:stretch>
+            <a:fillRect/>
+          </a:stretch>
+        </p:blipFill>
+        <p:spPr>
+          <a:xfrm>
+            <a:off x="4253593" y="3800536"/>
+            <a:ext cx="3162300" cy="2867025"/>
+          </a:xfrm>
+          <a:prstGeom prst="rect">
+            <a:avLst/>
+          </a:prstGeom>
+        </p:spPr>
+      </p:pic>
+      <p:sp>
+        <p:nvSpPr>
+          <p:cNvPr id="3" name="Content Placeholder 2"/>
+          <p:cNvSpPr>
+            <a:spLocks noGrp="1"/>
+          </p:cNvSpPr>
+          <p:nvPr>
+            <p:ph idx="1"/>
+          </p:nvPr>
+        </p:nvSpPr>
+        <p:spPr>
+          <a:xfrm>
+            <a:off x="838200" y="1457491"/>
+            <a:ext cx="10515600" cy="2520743"/>
+          </a:xfrm>
+        </p:spPr>
+        <p:txBody>
+          <a:bodyPr>
+            <a:normAutofit fontScale="92500" lnSpcReduction="10000"/>
+          </a:bodyPr>
+          <a:lstStyle/>
+          <a:p>
+            <a:r>
+              <a:rPr lang="en-CA" dirty="0"/>
+              <a:t>Here is one example timing diagram for our sequence </a:t>
+            </a:r>
+            <a:r>
+              <a:rPr lang="en-CA" dirty="0" smtClean="0"/>
+              <a:t>detector</a:t>
+            </a:r>
+          </a:p>
+          <a:p>
+            <a:pPr marL="457200" lvl="1" indent="0">
+              <a:buNone/>
+            </a:pPr>
+            <a:r>
+              <a:rPr lang="en-CA" dirty="0" smtClean="0"/>
+              <a:t>– </a:t>
+            </a:r>
+            <a:r>
+              <a:rPr lang="en-CA" dirty="0"/>
+              <a:t>The flip-flops Q</a:t>
+            </a:r>
+            <a:r>
+              <a:rPr lang="en-CA" sz="1700" dirty="0"/>
+              <a:t>1</a:t>
+            </a:r>
+            <a:r>
+              <a:rPr lang="en-CA" dirty="0"/>
+              <a:t>Q</a:t>
+            </a:r>
+            <a:r>
+              <a:rPr lang="en-CA" sz="1700" dirty="0"/>
+              <a:t>0</a:t>
+            </a:r>
+            <a:r>
+              <a:rPr lang="en-CA" dirty="0"/>
+              <a:t> start in the initial state, 00 </a:t>
+            </a:r>
+            <a:endParaRPr lang="en-CA" dirty="0" smtClean="0"/>
+          </a:p>
+          <a:p>
+            <a:pPr marL="457200" lvl="1" indent="0">
+              <a:buNone/>
+            </a:pPr>
+            <a:r>
+              <a:rPr lang="en-CA" dirty="0" smtClean="0"/>
+              <a:t>– </a:t>
+            </a:r>
+            <a:r>
+              <a:rPr lang="en-CA" dirty="0"/>
+              <a:t>On the first three positive clock edges, X is 1, 0, and 0. These inputs cause Q</a:t>
+            </a:r>
+            <a:r>
+              <a:rPr lang="en-CA" sz="1700" dirty="0"/>
+              <a:t>1</a:t>
+            </a:r>
+            <a:r>
+              <a:rPr lang="en-CA" dirty="0"/>
+              <a:t>Q</a:t>
+            </a:r>
+            <a:r>
+              <a:rPr lang="en-CA" sz="1700" dirty="0"/>
+              <a:t>0</a:t>
+            </a:r>
+            <a:r>
+              <a:rPr lang="en-CA" dirty="0"/>
+              <a:t> to change, so after the third edge Q</a:t>
+            </a:r>
+            <a:r>
+              <a:rPr lang="en-CA" sz="1700" dirty="0"/>
+              <a:t>1</a:t>
+            </a:r>
+            <a:r>
+              <a:rPr lang="en-CA" dirty="0"/>
+              <a:t>Q</a:t>
+            </a:r>
+            <a:r>
+              <a:rPr lang="en-CA" sz="1700" dirty="0"/>
+              <a:t>0</a:t>
+            </a:r>
+            <a:r>
+              <a:rPr lang="en-CA" dirty="0"/>
+              <a:t> = 11 </a:t>
+            </a:r>
+            <a:endParaRPr lang="en-CA" dirty="0" smtClean="0"/>
+          </a:p>
+          <a:p>
+            <a:pPr marL="457200" lvl="1" indent="0">
+              <a:buNone/>
+            </a:pPr>
+            <a:r>
+              <a:rPr lang="en-CA" dirty="0" smtClean="0"/>
+              <a:t>– </a:t>
+            </a:r>
+            <a:r>
+              <a:rPr lang="en-CA" dirty="0"/>
+              <a:t>Then when X=1, Z becomes 1 also, meaning that 1001 was found </a:t>
+            </a:r>
+            <a:endParaRPr lang="en-CA" dirty="0" smtClean="0"/>
+          </a:p>
+          <a:p>
+            <a:r>
+              <a:rPr lang="en-CA" dirty="0" smtClean="0"/>
+              <a:t>The </a:t>
+            </a:r>
+            <a:r>
+              <a:rPr lang="en-CA" dirty="0"/>
+              <a:t>output Z does not have to change at positive clock edges. Instead, it may change whenever X changes, since Z = Q</a:t>
+            </a:r>
+            <a:r>
+              <a:rPr lang="en-CA" sz="1700" dirty="0"/>
+              <a:t>1</a:t>
+            </a:r>
+            <a:r>
+              <a:rPr lang="en-CA" dirty="0"/>
+              <a:t>Q</a:t>
+            </a:r>
+            <a:r>
+              <a:rPr lang="en-CA" sz="1700" dirty="0"/>
+              <a:t>0</a:t>
+            </a:r>
+            <a:r>
+              <a:rPr lang="en-CA" dirty="0"/>
+              <a:t>X</a:t>
+            </a:r>
+          </a:p>
+        </p:txBody>
+      </p:sp>
+    </p:spTree>
+    <p:extLst>
+      <p:ext uri="{BB962C8B-B14F-4D97-AF65-F5344CB8AC3E}">
+        <p14:creationId xmlns:p14="http://schemas.microsoft.com/office/powerpoint/2010/main" val="3918853933"/>
+      </p:ext>
+    </p:extLst>
+  </p:cSld>
+  <p:clrMapOvr>
+    <a:masterClrMapping/>
+  </p:clrMapOvr>
+  <p:timing>
+    <p:tnLst>
+      <p:par>
+        <p:cTn id="1" dur="indefinite" restart="never" nodeType="tmRoot"/>
+      </p:par>
+    </p:tnLst>
+  </p:timing>
+</p:sld>
+</file>
+
+<file path=ppt/slides/slide83.xml><?xml version="1.0" encoding="utf-8"?>
+<p:sld xmlns:a="http://schemas.openxmlformats.org/drawingml/2006/main" xmlns:r="http://schemas.openxmlformats.org/officeDocument/2006/relationships" xmlns:p="http://schemas.openxmlformats.org/presentationml/2006/main">
+  <p:cSld>
+    <p:spTree>
+      <p:nvGrpSpPr>
+        <p:cNvPr id="1" name=""/>
+        <p:cNvGrpSpPr/>
+        <p:nvPr/>
+      </p:nvGrpSpPr>
+      <p:grpSpPr>
+        <a:xfrm>
+          <a:off x="0" y="0"/>
+          <a:ext cx="0" cy="0"/>
+          <a:chOff x="0" y="0"/>
+          <a:chExt cx="0" cy="0"/>
+        </a:xfrm>
+      </p:grpSpPr>
+      <p:sp>
+        <p:nvSpPr>
+          <p:cNvPr id="2" name="Title 1"/>
+          <p:cNvSpPr>
+            <a:spLocks noGrp="1"/>
+          </p:cNvSpPr>
+          <p:nvPr>
+            <p:ph type="title"/>
+          </p:nvPr>
+        </p:nvSpPr>
+        <p:spPr/>
+        <p:txBody>
+          <a:bodyPr/>
+          <a:lstStyle/>
+          <a:p>
+            <a:r>
+              <a:rPr lang="en-CA" dirty="0" smtClean="0"/>
+              <a:t>Summary</a:t>
+            </a:r>
+            <a:endParaRPr lang="en-CA" dirty="0"/>
+          </a:p>
+        </p:txBody>
+      </p:sp>
+      <p:sp>
+        <p:nvSpPr>
+          <p:cNvPr id="3" name="Content Placeholder 2"/>
+          <p:cNvSpPr>
+            <a:spLocks noGrp="1"/>
+          </p:cNvSpPr>
+          <p:nvPr>
+            <p:ph idx="1"/>
+          </p:nvPr>
+        </p:nvSpPr>
+        <p:spPr/>
+        <p:txBody>
+          <a:bodyPr/>
+          <a:lstStyle/>
+          <a:p>
+            <a:r>
+              <a:rPr lang="en-CA" dirty="0"/>
+              <a:t>The basic sequential circuit design procedure: </a:t>
+            </a:r>
+            <a:endParaRPr lang="en-CA" dirty="0" smtClean="0"/>
+          </a:p>
+          <a:p>
+            <a:pPr marL="457200" lvl="1" indent="0">
+              <a:buNone/>
+            </a:pPr>
+            <a:r>
+              <a:rPr lang="en-CA" dirty="0" smtClean="0"/>
+              <a:t>– </a:t>
+            </a:r>
+            <a:r>
+              <a:rPr lang="en-CA" dirty="0"/>
+              <a:t>Make a state table and, if desired, a state diagram. This step is usually the hardest </a:t>
+            </a:r>
+            <a:endParaRPr lang="en-CA" dirty="0" smtClean="0"/>
+          </a:p>
+          <a:p>
+            <a:pPr marL="457200" lvl="1" indent="0">
+              <a:buNone/>
+            </a:pPr>
+            <a:r>
+              <a:rPr lang="en-CA" dirty="0" smtClean="0"/>
+              <a:t>– </a:t>
+            </a:r>
+            <a:r>
+              <a:rPr lang="en-CA" dirty="0"/>
+              <a:t>Assign binary codes to the states if you didn’t already </a:t>
+            </a:r>
+            <a:endParaRPr lang="en-CA" dirty="0" smtClean="0"/>
+          </a:p>
+          <a:p>
+            <a:pPr marL="457200" lvl="1" indent="0">
+              <a:buNone/>
+            </a:pPr>
+            <a:r>
+              <a:rPr lang="en-CA" dirty="0" smtClean="0"/>
+              <a:t>– </a:t>
+            </a:r>
+            <a:r>
+              <a:rPr lang="en-CA" dirty="0"/>
+              <a:t>Use the present states, next states, and flip-flop excitation tables to find the flip-flop input values </a:t>
+            </a:r>
+            <a:endParaRPr lang="en-CA" dirty="0" smtClean="0"/>
+          </a:p>
+          <a:p>
+            <a:pPr marL="457200" lvl="1" indent="0">
+              <a:buNone/>
+            </a:pPr>
+            <a:r>
+              <a:rPr lang="en-CA" dirty="0" smtClean="0"/>
+              <a:t>– </a:t>
+            </a:r>
+            <a:r>
+              <a:rPr lang="en-CA" dirty="0"/>
+              <a:t>Write simplified equations for the flip-flop inputs and outputs and build the circuit</a:t>
+            </a:r>
+          </a:p>
+        </p:txBody>
+      </p:sp>
+    </p:spTree>
+    <p:extLst>
+      <p:ext uri="{BB962C8B-B14F-4D97-AF65-F5344CB8AC3E}">
+        <p14:creationId xmlns:p14="http://schemas.microsoft.com/office/powerpoint/2010/main" val="2884621830"/>
+      </p:ext>
+    </p:extLst>
+  </p:cSld>
+  <p:clrMapOvr>
+    <a:masterClrMapping/>
+  </p:clrMapOvr>
+  <p:timing>
+    <p:tnLst>
+      <p:par>
+        <p:cTn id="1" dur="indefinite" restart="never" nodeType="tmRoot"/>
+      </p:par>
+    </p:tnLst>
+  </p:timing>
 </p:sld>
 </file>
 

</xml_diff>